<commit_message>
update for warm-up and cool-down problems
</commit_message>
<xml_diff>
--- a/374 DS in detail.pptx
+++ b/374 DS in detail.pptx
@@ -34,7 +34,22 @@
     <p:sldId id="304" r:id="rId28"/>
     <p:sldId id="336" r:id="rId29"/>
     <p:sldId id="305" r:id="rId30"/>
-    <p:sldId id="324" r:id="rId31"/>
+    <p:sldId id="345" r:id="rId31"/>
+    <p:sldId id="338" r:id="rId32"/>
+    <p:sldId id="339" r:id="rId33"/>
+    <p:sldId id="341" r:id="rId34"/>
+    <p:sldId id="346" r:id="rId35"/>
+    <p:sldId id="347" r:id="rId36"/>
+    <p:sldId id="342" r:id="rId37"/>
+    <p:sldId id="348" r:id="rId38"/>
+    <p:sldId id="349" r:id="rId39"/>
+    <p:sldId id="344" r:id="rId40"/>
+    <p:sldId id="343" r:id="rId41"/>
+    <p:sldId id="340" r:id="rId42"/>
+    <p:sldId id="352" r:id="rId43"/>
+    <p:sldId id="350" r:id="rId44"/>
+    <p:sldId id="351" r:id="rId45"/>
+    <p:sldId id="324" r:id="rId46"/>
   </p:sldIdLst>
   <p:sldSz cx="12192000" cy="6858000"/>
   <p:notesSz cx="6858000" cy="9144000"/>
@@ -288,7 +303,7 @@
           <a:p>
             <a:fld id="{77EE7D20-2DA8-734D-A950-8DD41E3ED5DB}" type="datetimeFigureOut">
               <a:rPr lang="en-US" smtClean="0"/>
-              <a:t>2/23/26</a:t>
+              <a:t>2/25/26</a:t>
             </a:fld>
             <a:endParaRPr lang="en-US"/>
           </a:p>
@@ -486,7 +501,7 @@
           <a:p>
             <a:fld id="{77EE7D20-2DA8-734D-A950-8DD41E3ED5DB}" type="datetimeFigureOut">
               <a:rPr lang="en-US" smtClean="0"/>
-              <a:t>2/23/26</a:t>
+              <a:t>2/25/26</a:t>
             </a:fld>
             <a:endParaRPr lang="en-US"/>
           </a:p>
@@ -694,7 +709,7 @@
           <a:p>
             <a:fld id="{77EE7D20-2DA8-734D-A950-8DD41E3ED5DB}" type="datetimeFigureOut">
               <a:rPr lang="en-US" smtClean="0"/>
-              <a:t>2/23/26</a:t>
+              <a:t>2/25/26</a:t>
             </a:fld>
             <a:endParaRPr lang="en-US"/>
           </a:p>
@@ -892,7 +907,7 @@
           <a:p>
             <a:fld id="{77EE7D20-2DA8-734D-A950-8DD41E3ED5DB}" type="datetimeFigureOut">
               <a:rPr lang="en-US" smtClean="0"/>
-              <a:t>2/23/26</a:t>
+              <a:t>2/25/26</a:t>
             </a:fld>
             <a:endParaRPr lang="en-US"/>
           </a:p>
@@ -1167,7 +1182,7 @@
           <a:p>
             <a:fld id="{77EE7D20-2DA8-734D-A950-8DD41E3ED5DB}" type="datetimeFigureOut">
               <a:rPr lang="en-US" smtClean="0"/>
-              <a:t>2/23/26</a:t>
+              <a:t>2/25/26</a:t>
             </a:fld>
             <a:endParaRPr lang="en-US"/>
           </a:p>
@@ -1432,7 +1447,7 @@
           <a:p>
             <a:fld id="{77EE7D20-2DA8-734D-A950-8DD41E3ED5DB}" type="datetimeFigureOut">
               <a:rPr lang="en-US" smtClean="0"/>
-              <a:t>2/23/26</a:t>
+              <a:t>2/25/26</a:t>
             </a:fld>
             <a:endParaRPr lang="en-US"/>
           </a:p>
@@ -1844,7 +1859,7 @@
           <a:p>
             <a:fld id="{77EE7D20-2DA8-734D-A950-8DD41E3ED5DB}" type="datetimeFigureOut">
               <a:rPr lang="en-US" smtClean="0"/>
-              <a:t>2/23/26</a:t>
+              <a:t>2/25/26</a:t>
             </a:fld>
             <a:endParaRPr lang="en-US"/>
           </a:p>
@@ -1985,7 +2000,7 @@
           <a:p>
             <a:fld id="{77EE7D20-2DA8-734D-A950-8DD41E3ED5DB}" type="datetimeFigureOut">
               <a:rPr lang="en-US" smtClean="0"/>
-              <a:t>2/23/26</a:t>
+              <a:t>2/25/26</a:t>
             </a:fld>
             <a:endParaRPr lang="en-US"/>
           </a:p>
@@ -2098,7 +2113,7 @@
           <a:p>
             <a:fld id="{77EE7D20-2DA8-734D-A950-8DD41E3ED5DB}" type="datetimeFigureOut">
               <a:rPr lang="en-US" smtClean="0"/>
-              <a:t>2/23/26</a:t>
+              <a:t>2/25/26</a:t>
             </a:fld>
             <a:endParaRPr lang="en-US"/>
           </a:p>
@@ -2409,7 +2424,7 @@
           <a:p>
             <a:fld id="{77EE7D20-2DA8-734D-A950-8DD41E3ED5DB}" type="datetimeFigureOut">
               <a:rPr lang="en-US" smtClean="0"/>
-              <a:t>2/23/26</a:t>
+              <a:t>2/25/26</a:t>
             </a:fld>
             <a:endParaRPr lang="en-US"/>
           </a:p>
@@ -2697,7 +2712,7 @@
           <a:p>
             <a:fld id="{77EE7D20-2DA8-734D-A950-8DD41E3ED5DB}" type="datetimeFigureOut">
               <a:rPr lang="en-US" smtClean="0"/>
-              <a:t>2/23/26</a:t>
+              <a:t>2/25/26</a:t>
             </a:fld>
             <a:endParaRPr lang="en-US"/>
           </a:p>
@@ -2938,7 +2953,7 @@
           <a:p>
             <a:fld id="{77EE7D20-2DA8-734D-A950-8DD41E3ED5DB}" type="datetimeFigureOut">
               <a:rPr lang="en-US" smtClean="0"/>
-              <a:t>2/23/26</a:t>
+              <a:t>2/25/26</a:t>
             </a:fld>
             <a:endParaRPr lang="en-US"/>
           </a:p>
@@ -3634,8 +3649,8 @@
           </a:p>
         </p:txBody>
       </p:sp>
-      <mc:AlternateContent xmlns:mc="http://schemas.openxmlformats.org/markup-compatibility/2006">
-        <mc:Choice xmlns:a14="http://schemas.microsoft.com/office/drawing/2010/main" Requires="a14">
+      <mc:AlternateContent xmlns:mc="http://schemas.openxmlformats.org/markup-compatibility/2006" xmlns:a14="http://schemas.microsoft.com/office/drawing/2010/main">
+        <mc:Choice Requires="a14">
           <p:sp>
             <p:nvSpPr>
               <p:cNvPr id="3" name="Content Placeholder 2">
@@ -3723,7 +3738,7 @@
             </p:txBody>
           </p:sp>
         </mc:Choice>
-        <mc:Fallback>
+        <mc:Fallback xmlns="">
           <p:sp>
             <p:nvSpPr>
               <p:cNvPr id="3" name="Content Placeholder 2">
@@ -3793,8 +3808,8 @@
           <a:chExt cx="0" cy="0"/>
         </a:xfrm>
       </p:grpSpPr>
-      <mc:AlternateContent xmlns:mc="http://schemas.openxmlformats.org/markup-compatibility/2006">
-        <mc:Choice xmlns:a14="http://schemas.microsoft.com/office/drawing/2010/main" Requires="a14">
+      <mc:AlternateContent xmlns:mc="http://schemas.openxmlformats.org/markup-compatibility/2006" xmlns:a14="http://schemas.microsoft.com/office/drawing/2010/main">
+        <mc:Choice Requires="a14">
           <p:sp>
             <p:nvSpPr>
               <p:cNvPr id="8" name="Title 7">
@@ -3864,7 +3879,7 @@
             </p:txBody>
           </p:sp>
         </mc:Choice>
-        <mc:Fallback>
+        <mc:Fallback xmlns="">
           <p:sp>
             <p:nvSpPr>
               <p:cNvPr id="8" name="Title 7">
@@ -4170,8 +4185,8 @@
           <a:chExt cx="0" cy="0"/>
         </a:xfrm>
       </p:grpSpPr>
-      <mc:AlternateContent xmlns:mc="http://schemas.openxmlformats.org/markup-compatibility/2006">
-        <mc:Choice xmlns:a14="http://schemas.microsoft.com/office/drawing/2010/main" Requires="a14">
+      <mc:AlternateContent xmlns:mc="http://schemas.openxmlformats.org/markup-compatibility/2006" xmlns:a14="http://schemas.microsoft.com/office/drawing/2010/main">
+        <mc:Choice Requires="a14">
           <p:sp>
             <p:nvSpPr>
               <p:cNvPr id="8" name="Title 7">
@@ -4241,7 +4256,7 @@
             </p:txBody>
           </p:sp>
         </mc:Choice>
-        <mc:Fallback>
+        <mc:Fallback xmlns="">
           <p:sp>
             <p:nvSpPr>
               <p:cNvPr id="8" name="Title 7">
@@ -4732,8 +4747,8 @@
           </a:p>
         </p:txBody>
       </p:sp>
-      <mc:AlternateContent xmlns:mc="http://schemas.openxmlformats.org/markup-compatibility/2006">
-        <mc:Choice xmlns:a14="http://schemas.microsoft.com/office/drawing/2010/main" Requires="a14">
+      <mc:AlternateContent xmlns:mc="http://schemas.openxmlformats.org/markup-compatibility/2006" xmlns:a14="http://schemas.microsoft.com/office/drawing/2010/main">
+        <mc:Choice Requires="a14">
           <p:sp>
             <p:nvSpPr>
               <p:cNvPr id="3" name="Content Placeholder 2">
@@ -4859,7 +4874,7 @@
             </p:txBody>
           </p:sp>
         </mc:Choice>
-        <mc:Fallback>
+        <mc:Fallback xmlns="">
           <p:sp>
             <p:nvSpPr>
               <p:cNvPr id="3" name="Content Placeholder 2">
@@ -4986,8 +5001,8 @@
           </a:p>
         </p:txBody>
       </p:sp>
-      <mc:AlternateContent xmlns:mc="http://schemas.openxmlformats.org/markup-compatibility/2006">
-        <mc:Choice xmlns:a14="http://schemas.microsoft.com/office/drawing/2010/main" Requires="a14">
+      <mc:AlternateContent xmlns:mc="http://schemas.openxmlformats.org/markup-compatibility/2006" xmlns:a14="http://schemas.microsoft.com/office/drawing/2010/main">
+        <mc:Choice Requires="a14">
           <p:sp>
             <p:nvSpPr>
               <p:cNvPr id="3" name="Content Placeholder 2">
@@ -5172,7 +5187,7 @@
             </p:txBody>
           </p:sp>
         </mc:Choice>
-        <mc:Fallback>
+        <mc:Fallback xmlns="">
           <p:sp>
             <p:nvSpPr>
               <p:cNvPr id="3" name="Content Placeholder 2">
@@ -7171,7 +7186,7 @@
           <p:cNvPr id="4" name="Title 3">
             <a:extLst>
               <a:ext uri="{FF2B5EF4-FFF2-40B4-BE49-F238E27FC236}">
-                <a16:creationId xmlns:a16="http://schemas.microsoft.com/office/drawing/2014/main" id="{1AB13D4F-4B54-2CFD-45CE-D820434DD421}"/>
+                <a16:creationId xmlns:a16="http://schemas.microsoft.com/office/drawing/2014/main" id="{7CC50D92-D643-815E-61E9-61ABBAC79565}"/>
               </a:ext>
             </a:extLst>
           </p:cNvPr>
@@ -7184,45 +7199,1329 @@
         </p:nvSpPr>
         <p:spPr/>
         <p:txBody>
-          <a:bodyPr/>
+          <a:bodyPr>
+            <a:normAutofit/>
+          </a:bodyPr>
           <a:lstStyle/>
           <a:p>
             <a:r>
               <a:rPr lang="en-US" dirty="0"/>
-              <a:t>These slides are work-in-progress; more will be added</a:t>
-            </a:r>
-          </a:p>
-        </p:txBody>
-      </p:sp>
-      <p:sp>
-        <p:nvSpPr>
-          <p:cNvPr id="5" name="Text Placeholder 4">
-            <a:extLst>
-              <a:ext uri="{FF2B5EF4-FFF2-40B4-BE49-F238E27FC236}">
-                <a16:creationId xmlns:a16="http://schemas.microsoft.com/office/drawing/2014/main" id="{4E8CBB95-B5A0-4E31-8197-E2631EE1CA41}"/>
-              </a:ext>
-            </a:extLst>
-          </p:cNvPr>
-          <p:cNvSpPr>
-            <a:spLocks noGrp="1"/>
-          </p:cNvSpPr>
-          <p:nvPr>
-            <p:ph type="body" idx="1"/>
-          </p:nvPr>
-        </p:nvSpPr>
-        <p:spPr/>
-        <p:txBody>
-          <a:bodyPr/>
-          <a:lstStyle/>
-          <a:p>
-            <a:endParaRPr lang="en-US"/>
+              <a:t>Warm-up</a:t>
+            </a:r>
+            <a:br>
+              <a:rPr lang="en-US" dirty="0"/>
+            </a:br>
+            <a:r>
+              <a:rPr lang="en-US" dirty="0"/>
+              <a:t>Meet up with your teams. On the whiteboard:</a:t>
+            </a:r>
+          </a:p>
+        </p:txBody>
+      </p:sp>
+      <mc:AlternateContent xmlns:mc="http://schemas.openxmlformats.org/markup-compatibility/2006">
+        <mc:Choice xmlns:a14="http://schemas.microsoft.com/office/drawing/2010/main" Requires="a14">
+          <p:sp>
+            <p:nvSpPr>
+              <p:cNvPr id="5" name="Content Placeholder 4">
+                <a:extLst>
+                  <a:ext uri="{FF2B5EF4-FFF2-40B4-BE49-F238E27FC236}">
+                    <a16:creationId xmlns:a16="http://schemas.microsoft.com/office/drawing/2014/main" id="{78BEB413-2B48-07FE-04EA-F84AE000F8E8}"/>
+                  </a:ext>
+                </a:extLst>
+              </p:cNvPr>
+              <p:cNvSpPr>
+                <a:spLocks noGrp="1"/>
+              </p:cNvSpPr>
+              <p:nvPr>
+                <p:ph sz="half" idx="1"/>
+              </p:nvPr>
+            </p:nvSpPr>
+            <p:spPr>
+              <a:xfrm>
+                <a:off x="838200" y="1825625"/>
+                <a:ext cx="5181600" cy="4888326"/>
+              </a:xfrm>
+              <a:ln>
+                <a:solidFill>
+                  <a:schemeClr val="accent1"/>
+                </a:solidFill>
+              </a:ln>
+            </p:spPr>
+            <p:txBody>
+              <a:bodyPr>
+                <a:normAutofit lnSpcReduction="10000"/>
+              </a:bodyPr>
+              <a:lstStyle/>
+              <a:p>
+                <a:pPr marL="0" indent="0">
+                  <a:buNone/>
+                </a:pPr>
+                <a:r>
+                  <a:rPr lang="en-US" b="1" u="sng" dirty="0"/>
+                  <a:t>Problem A.</a:t>
+                </a:r>
+              </a:p>
+              <a:p>
+                <a:r>
+                  <a:rPr lang="en-US" dirty="0"/>
+                  <a:t>Using </a:t>
+                </a:r>
+                <a:r>
+                  <a:rPr lang="en-US" i="1" dirty="0"/>
+                  <a:t>mod 6</a:t>
+                </a:r>
+                <a:r>
+                  <a:rPr lang="en-US" dirty="0"/>
+                  <a:t>, </a:t>
+                </a:r>
+              </a:p>
+              <a:p>
+                <a:r>
+                  <a:rPr lang="en-US" dirty="0"/>
+                  <a:t>Create a hash table for 10, 20, 7, 11, 17, 14, 2, 4, 6, 15, 3</a:t>
+                </a:r>
+              </a:p>
+              <a:p>
+                <a:r>
+                  <a:rPr lang="en-US" dirty="0"/>
+                  <a:t>Equation: </a:t>
+                </a:r>
+              </a:p>
+              <a:p>
+                <a:pPr lvl="1"/>
+                <a14:m>
+                  <m:oMath xmlns:m="http://schemas.openxmlformats.org/officeDocument/2006/math">
+                    <m:r>
+                      <a:rPr lang="en-US" i="1" dirty="0" smtClean="0">
+                        <a:latin typeface="Cambria Math" panose="02040503050406030204" pitchFamily="18" charset="0"/>
+                      </a:rPr>
+                      <m:t>𝑓</m:t>
+                    </m:r>
+                    <m:d>
+                      <m:dPr>
+                        <m:ctrlPr>
+                          <a:rPr lang="en-US" i="1" dirty="0" smtClean="0">
+                            <a:latin typeface="Cambria Math" panose="02040503050406030204" pitchFamily="18" charset="0"/>
+                          </a:rPr>
+                        </m:ctrlPr>
+                      </m:dPr>
+                      <m:e>
+                        <m:r>
+                          <a:rPr lang="en-US" i="1" dirty="0" smtClean="0">
+                            <a:latin typeface="Cambria Math" panose="02040503050406030204" pitchFamily="18" charset="0"/>
+                          </a:rPr>
+                          <m:t>𝑥</m:t>
+                        </m:r>
+                      </m:e>
+                    </m:d>
+                    <m:r>
+                      <a:rPr lang="en-US" i="1" dirty="0" smtClean="0">
+                        <a:latin typeface="Cambria Math" panose="02040503050406030204" pitchFamily="18" charset="0"/>
+                      </a:rPr>
+                      <m:t>=18</m:t>
+                    </m:r>
+                    <m:sSup>
+                      <m:sSupPr>
+                        <m:ctrlPr>
+                          <a:rPr lang="en-US" i="1" dirty="0" smtClean="0">
+                            <a:latin typeface="Cambria Math" panose="02040503050406030204" pitchFamily="18" charset="0"/>
+                          </a:rPr>
+                        </m:ctrlPr>
+                      </m:sSupPr>
+                      <m:e>
+                        <m:r>
+                          <a:rPr lang="en-US" i="1" dirty="0" smtClean="0">
+                            <a:latin typeface="Cambria Math" panose="02040503050406030204" pitchFamily="18" charset="0"/>
+                          </a:rPr>
+                          <m:t>𝑥</m:t>
+                        </m:r>
+                      </m:e>
+                      <m:sup>
+                        <m:r>
+                          <a:rPr lang="en-US" i="1" dirty="0" smtClean="0">
+                            <a:latin typeface="Cambria Math" panose="02040503050406030204" pitchFamily="18" charset="0"/>
+                          </a:rPr>
+                          <m:t>6</m:t>
+                        </m:r>
+                      </m:sup>
+                    </m:sSup>
+                    <m:r>
+                      <a:rPr lang="en-US" i="1" dirty="0" smtClean="0">
+                        <a:latin typeface="Cambria Math" panose="02040503050406030204" pitchFamily="18" charset="0"/>
+                      </a:rPr>
+                      <m:t>−</m:t>
+                    </m:r>
+                    <m:sSup>
+                      <m:sSupPr>
+                        <m:ctrlPr>
+                          <a:rPr lang="en-US" i="1" dirty="0" smtClean="0">
+                            <a:latin typeface="Cambria Math" panose="02040503050406030204" pitchFamily="18" charset="0"/>
+                          </a:rPr>
+                        </m:ctrlPr>
+                      </m:sSupPr>
+                      <m:e>
+                        <m:r>
+                          <a:rPr lang="en-US" i="1" dirty="0" smtClean="0">
+                            <a:latin typeface="Cambria Math" panose="02040503050406030204" pitchFamily="18" charset="0"/>
+                          </a:rPr>
+                          <m:t>𝑥</m:t>
+                        </m:r>
+                      </m:e>
+                      <m:sup>
+                        <m:r>
+                          <a:rPr lang="en-US" i="1" dirty="0" smtClean="0">
+                            <a:latin typeface="Cambria Math" panose="02040503050406030204" pitchFamily="18" charset="0"/>
+                          </a:rPr>
+                          <m:t>4</m:t>
+                        </m:r>
+                      </m:sup>
+                    </m:sSup>
+                    <m:r>
+                      <a:rPr lang="en-US" i="1" dirty="0" smtClean="0">
+                        <a:latin typeface="Cambria Math" panose="02040503050406030204" pitchFamily="18" charset="0"/>
+                      </a:rPr>
+                      <m:t>+4</m:t>
+                    </m:r>
+                    <m:sSup>
+                      <m:sSupPr>
+                        <m:ctrlPr>
+                          <a:rPr lang="en-US" i="1" dirty="0" smtClean="0">
+                            <a:latin typeface="Cambria Math" panose="02040503050406030204" pitchFamily="18" charset="0"/>
+                          </a:rPr>
+                        </m:ctrlPr>
+                      </m:sSupPr>
+                      <m:e>
+                        <m:r>
+                          <a:rPr lang="en-US" i="1" dirty="0" smtClean="0">
+                            <a:latin typeface="Cambria Math" panose="02040503050406030204" pitchFamily="18" charset="0"/>
+                          </a:rPr>
+                          <m:t>𝑥</m:t>
+                        </m:r>
+                      </m:e>
+                      <m:sup>
+                        <m:r>
+                          <a:rPr lang="en-US" i="1" dirty="0" smtClean="0">
+                            <a:latin typeface="Cambria Math" panose="02040503050406030204" pitchFamily="18" charset="0"/>
+                          </a:rPr>
+                          <m:t>3</m:t>
+                        </m:r>
+                      </m:sup>
+                    </m:sSup>
+                    <m:r>
+                      <a:rPr lang="en-US" i="1" dirty="0" smtClean="0">
+                        <a:latin typeface="Cambria Math" panose="02040503050406030204" pitchFamily="18" charset="0"/>
+                      </a:rPr>
+                      <m:t>+21</m:t>
+                    </m:r>
+                    <m:r>
+                      <a:rPr lang="en-US" i="1" dirty="0" smtClean="0">
+                        <a:latin typeface="Cambria Math" panose="02040503050406030204" pitchFamily="18" charset="0"/>
+                      </a:rPr>
+                      <m:t>𝑥</m:t>
+                    </m:r>
+                    <m:r>
+                      <a:rPr lang="en-US" i="1" dirty="0" smtClean="0">
+                        <a:latin typeface="Cambria Math" panose="02040503050406030204" pitchFamily="18" charset="0"/>
+                      </a:rPr>
+                      <m:t>+2</m:t>
+                    </m:r>
+                  </m:oMath>
+                </a14:m>
+              </a:p>
+              <a:p>
+                <a:r>
+                  <a:rPr lang="en-US" dirty="0"/>
+                  <a:t>Rehash when </a:t>
+                </a:r>
+                <a14:m>
+                  <m:oMath xmlns:m="http://schemas.openxmlformats.org/officeDocument/2006/math">
+                    <m:r>
+                      <a:rPr lang="en-US" i="1" dirty="0" smtClean="0">
+                        <a:latin typeface="Cambria Math" panose="02040503050406030204" pitchFamily="18" charset="0"/>
+                      </a:rPr>
+                      <m:t>𝛼</m:t>
+                    </m:r>
+                    <m:r>
+                      <a:rPr lang="en-US" i="1" dirty="0" smtClean="0">
+                        <a:latin typeface="Cambria Math" panose="02040503050406030204" pitchFamily="18" charset="0"/>
+                      </a:rPr>
+                      <m:t>&gt; 0.6</m:t>
+                    </m:r>
+                  </m:oMath>
+                </a14:m>
+                <a:r>
+                  <a:rPr lang="en-US" dirty="0"/>
+                  <a:t>. What do you choose for new mod? Why?</a:t>
+                </a:r>
+              </a:p>
+              <a:p>
+                <a:r>
+                  <a:rPr lang="en-US" dirty="0"/>
+                  <a:t>Use your choice of collision resolution</a:t>
+                </a:r>
+              </a:p>
+            </p:txBody>
+          </p:sp>
+        </mc:Choice>
+        <mc:Fallback>
+          <p:sp>
+            <p:nvSpPr>
+              <p:cNvPr id="5" name="Content Placeholder 4">
+                <a:extLst>
+                  <a:ext uri="{FF2B5EF4-FFF2-40B4-BE49-F238E27FC236}">
+                    <a16:creationId xmlns:a16="http://schemas.microsoft.com/office/drawing/2014/main" id="{78BEB413-2B48-07FE-04EA-F84AE000F8E8}"/>
+                  </a:ext>
+                </a:extLst>
+              </p:cNvPr>
+              <p:cNvSpPr>
+                <a:spLocks noGrp="1" noRot="1" noChangeAspect="1" noMove="1" noResize="1" noEditPoints="1" noAdjustHandles="1" noChangeArrowheads="1" noChangeShapeType="1" noTextEdit="1"/>
+              </p:cNvSpPr>
+              <p:nvPr>
+                <p:ph sz="half" idx="1"/>
+              </p:nvPr>
+            </p:nvSpPr>
+            <p:spPr>
+              <a:xfrm>
+                <a:off x="838200" y="1825625"/>
+                <a:ext cx="5181600" cy="4888326"/>
+              </a:xfrm>
+              <a:blipFill>
+                <a:blip r:embed="rId2"/>
+                <a:stretch>
+                  <a:fillRect l="-2195" t="-2850" b="-1813"/>
+                </a:stretch>
+              </a:blipFill>
+              <a:ln>
+                <a:solidFill>
+                  <a:schemeClr val="accent1"/>
+                </a:solidFill>
+              </a:ln>
+            </p:spPr>
+            <p:txBody>
+              <a:bodyPr/>
+              <a:lstStyle/>
+              <a:p>
+                <a:r>
+                  <a:rPr lang="en-US">
+                    <a:noFill/>
+                  </a:rPr>
+                  <a:t> </a:t>
+                </a:r>
+              </a:p>
+            </p:txBody>
+          </p:sp>
+        </mc:Fallback>
+      </mc:AlternateContent>
+      <p:sp>
+        <p:nvSpPr>
+          <p:cNvPr id="6" name="Content Placeholder 5">
+            <a:extLst>
+              <a:ext uri="{FF2B5EF4-FFF2-40B4-BE49-F238E27FC236}">
+                <a16:creationId xmlns:a16="http://schemas.microsoft.com/office/drawing/2014/main" id="{B3C39C96-61DE-CF82-39AF-FFFA48F62B5E}"/>
+              </a:ext>
+            </a:extLst>
+          </p:cNvPr>
+          <p:cNvSpPr>
+            <a:spLocks noGrp="1"/>
+          </p:cNvSpPr>
+          <p:nvPr>
+            <p:ph sz="half" idx="2"/>
+          </p:nvPr>
+        </p:nvSpPr>
+        <p:spPr>
+          <a:ln>
+            <a:solidFill>
+              <a:schemeClr val="accent1"/>
+            </a:solidFill>
+          </a:ln>
+        </p:spPr>
+        <p:txBody>
+          <a:bodyPr>
+            <a:normAutofit lnSpcReduction="10000"/>
+          </a:bodyPr>
+          <a:lstStyle/>
+          <a:p>
+            <a:pPr marL="0" indent="0">
+              <a:buNone/>
+            </a:pPr>
+            <a:r>
+              <a:rPr lang="en-US" b="1" u="sng" dirty="0"/>
+              <a:t>Problem B.</a:t>
+            </a:r>
+          </a:p>
+          <a:p>
+            <a:r>
+              <a:rPr lang="en-US" dirty="0"/>
+              <a:t>Create a binary search tree for 20, 10, 7, 11, 17, 14, 2, 4, 6, 15, 3</a:t>
+            </a:r>
+          </a:p>
+          <a:p>
+            <a:endParaRPr lang="en-US" dirty="0"/>
+          </a:p>
+          <a:p>
+            <a:r>
+              <a:rPr lang="en-US" dirty="0"/>
+              <a:t>Create a binary search tree for 17, 10, 7, 11, 20, 14, 2, 4, 6, 15, 3</a:t>
+            </a:r>
+          </a:p>
+          <a:p>
+            <a:r>
+              <a:rPr lang="en-US" dirty="0"/>
+              <a:t>These are the same numbers: What's the difference?</a:t>
+            </a:r>
           </a:p>
         </p:txBody>
       </p:sp>
     </p:spTree>
     <p:extLst>
       <p:ext uri="{BB962C8B-B14F-4D97-AF65-F5344CB8AC3E}">
-        <p14:creationId xmlns:p14="http://schemas.microsoft.com/office/powerpoint/2010/main" val="661472011"/>
+        <p14:creationId xmlns:p14="http://schemas.microsoft.com/office/powerpoint/2010/main" val="472734994"/>
+      </p:ext>
+    </p:extLst>
+  </p:cSld>
+  <p:clrMapOvr>
+    <a:masterClrMapping/>
+  </p:clrMapOvr>
+</p:sld>
+</file>
+
+<file path=ppt/slides/slide31.xml><?xml version="1.0" encoding="utf-8"?>
+<p:sld xmlns:a="http://schemas.openxmlformats.org/drawingml/2006/main" xmlns:r="http://schemas.openxmlformats.org/officeDocument/2006/relationships" xmlns:p="http://schemas.openxmlformats.org/presentationml/2006/main">
+  <p:cSld>
+    <p:spTree>
+      <p:nvGrpSpPr>
+        <p:cNvPr id="1" name=""/>
+        <p:cNvGrpSpPr/>
+        <p:nvPr/>
+      </p:nvGrpSpPr>
+      <p:grpSpPr>
+        <a:xfrm>
+          <a:off x="0" y="0"/>
+          <a:ext cx="0" cy="0"/>
+          <a:chOff x="0" y="0"/>
+          <a:chExt cx="0" cy="0"/>
+        </a:xfrm>
+      </p:grpSpPr>
+      <p:sp>
+        <p:nvSpPr>
+          <p:cNvPr id="2" name="Title 1">
+            <a:extLst>
+              <a:ext uri="{FF2B5EF4-FFF2-40B4-BE49-F238E27FC236}">
+                <a16:creationId xmlns:a16="http://schemas.microsoft.com/office/drawing/2014/main" id="{5C230EA8-84E4-1A7D-D236-C0550EB875C9}"/>
+              </a:ext>
+            </a:extLst>
+          </p:cNvPr>
+          <p:cNvSpPr>
+            <a:spLocks noGrp="1"/>
+          </p:cNvSpPr>
+          <p:nvPr>
+            <p:ph type="title"/>
+          </p:nvPr>
+        </p:nvSpPr>
+        <p:spPr/>
+        <p:txBody>
+          <a:bodyPr/>
+          <a:lstStyle/>
+          <a:p>
+            <a:r>
+              <a:rPr lang="en-US" dirty="0"/>
+              <a:t>Heaps</a:t>
+            </a:r>
+          </a:p>
+        </p:txBody>
+      </p:sp>
+      <p:sp>
+        <p:nvSpPr>
+          <p:cNvPr id="3" name="Text Placeholder 2">
+            <a:extLst>
+              <a:ext uri="{FF2B5EF4-FFF2-40B4-BE49-F238E27FC236}">
+                <a16:creationId xmlns:a16="http://schemas.microsoft.com/office/drawing/2014/main" id="{4135338B-05C5-5D09-0C84-CC24AADE0A5B}"/>
+              </a:ext>
+            </a:extLst>
+          </p:cNvPr>
+          <p:cNvSpPr>
+            <a:spLocks noGrp="1"/>
+          </p:cNvSpPr>
+          <p:nvPr>
+            <p:ph type="body" idx="1"/>
+          </p:nvPr>
+        </p:nvSpPr>
+        <p:spPr/>
+        <p:txBody>
+          <a:bodyPr/>
+          <a:lstStyle/>
+          <a:p>
+            <a:endParaRPr lang="en-US"/>
+          </a:p>
+        </p:txBody>
+      </p:sp>
+    </p:spTree>
+    <p:extLst>
+      <p:ext uri="{BB962C8B-B14F-4D97-AF65-F5344CB8AC3E}">
+        <p14:creationId xmlns:p14="http://schemas.microsoft.com/office/powerpoint/2010/main" val="685420919"/>
+      </p:ext>
+    </p:extLst>
+  </p:cSld>
+  <p:clrMapOvr>
+    <a:masterClrMapping/>
+  </p:clrMapOvr>
+</p:sld>
+</file>
+
+<file path=ppt/slides/slide32.xml><?xml version="1.0" encoding="utf-8"?>
+<p:sld xmlns:a="http://schemas.openxmlformats.org/drawingml/2006/main" xmlns:r="http://schemas.openxmlformats.org/officeDocument/2006/relationships" xmlns:p="http://schemas.openxmlformats.org/presentationml/2006/main">
+  <p:cSld>
+    <p:spTree>
+      <p:nvGrpSpPr>
+        <p:cNvPr id="1" name=""/>
+        <p:cNvGrpSpPr/>
+        <p:nvPr/>
+      </p:nvGrpSpPr>
+      <p:grpSpPr>
+        <a:xfrm>
+          <a:off x="0" y="0"/>
+          <a:ext cx="0" cy="0"/>
+          <a:chOff x="0" y="0"/>
+          <a:chExt cx="0" cy="0"/>
+        </a:xfrm>
+      </p:grpSpPr>
+      <p:sp>
+        <p:nvSpPr>
+          <p:cNvPr id="4" name="Title 3">
+            <a:extLst>
+              <a:ext uri="{FF2B5EF4-FFF2-40B4-BE49-F238E27FC236}">
+                <a16:creationId xmlns:a16="http://schemas.microsoft.com/office/drawing/2014/main" id="{C7A561DD-9A27-9E11-DB99-49CE0988E2E6}"/>
+              </a:ext>
+            </a:extLst>
+          </p:cNvPr>
+          <p:cNvSpPr>
+            <a:spLocks noGrp="1"/>
+          </p:cNvSpPr>
+          <p:nvPr>
+            <p:ph type="title"/>
+          </p:nvPr>
+        </p:nvSpPr>
+        <p:spPr/>
+        <p:txBody>
+          <a:bodyPr/>
+          <a:lstStyle/>
+          <a:p>
+            <a:r>
+              <a:rPr lang="en-US" dirty="0"/>
+              <a:t>Heaps</a:t>
+            </a:r>
+          </a:p>
+        </p:txBody>
+      </p:sp>
+      <p:sp>
+        <p:nvSpPr>
+          <p:cNvPr id="5" name="Content Placeholder 4">
+            <a:extLst>
+              <a:ext uri="{FF2B5EF4-FFF2-40B4-BE49-F238E27FC236}">
+                <a16:creationId xmlns:a16="http://schemas.microsoft.com/office/drawing/2014/main" id="{285E74D5-7FF5-B6A9-097D-2B1161392B78}"/>
+              </a:ext>
+            </a:extLst>
+          </p:cNvPr>
+          <p:cNvSpPr>
+            <a:spLocks noGrp="1"/>
+          </p:cNvSpPr>
+          <p:nvPr>
+            <p:ph idx="1"/>
+          </p:nvPr>
+        </p:nvSpPr>
+        <p:spPr/>
+        <p:txBody>
+          <a:bodyPr/>
+          <a:lstStyle/>
+          <a:p>
+            <a:r>
+              <a:rPr lang="en-US" dirty="0"/>
+              <a:t>Min-heap: smaller = at the top</a:t>
+            </a:r>
+          </a:p>
+          <a:p>
+            <a:r>
+              <a:rPr lang="en-US" dirty="0"/>
+              <a:t>Max-heap: larger = at the top</a:t>
+            </a:r>
+          </a:p>
+          <a:p>
+            <a:endParaRPr lang="en-US" dirty="0"/>
+          </a:p>
+          <a:p>
+            <a:r>
+              <a:rPr lang="en-US" dirty="0"/>
+              <a:t>Complete binary tree</a:t>
+            </a:r>
+          </a:p>
+          <a:p>
+            <a:pPr lvl="1"/>
+            <a:r>
+              <a:rPr lang="en-US" dirty="0"/>
+              <a:t>All levels are filled…</a:t>
+            </a:r>
+          </a:p>
+          <a:p>
+            <a:pPr lvl="1"/>
+            <a:r>
+              <a:rPr lang="en-US" dirty="0"/>
+              <a:t>…except maybe the last one</a:t>
+            </a:r>
+          </a:p>
+          <a:p>
+            <a:pPr lvl="1"/>
+            <a:r>
+              <a:rPr lang="en-US" dirty="0"/>
+              <a:t>Last level gets filled Left to Right.</a:t>
+            </a:r>
+          </a:p>
+        </p:txBody>
+      </p:sp>
+    </p:spTree>
+    <p:extLst>
+      <p:ext uri="{BB962C8B-B14F-4D97-AF65-F5344CB8AC3E}">
+        <p14:creationId xmlns:p14="http://schemas.microsoft.com/office/powerpoint/2010/main" val="4056197656"/>
+      </p:ext>
+    </p:extLst>
+  </p:cSld>
+  <p:clrMapOvr>
+    <a:masterClrMapping/>
+  </p:clrMapOvr>
+</p:sld>
+</file>
+
+<file path=ppt/slides/slide33.xml><?xml version="1.0" encoding="utf-8"?>
+<p:sld xmlns:a="http://schemas.openxmlformats.org/drawingml/2006/main" xmlns:r="http://schemas.openxmlformats.org/officeDocument/2006/relationships" xmlns:p="http://schemas.openxmlformats.org/presentationml/2006/main">
+  <p:cSld>
+    <p:spTree>
+      <p:nvGrpSpPr>
+        <p:cNvPr id="1" name=""/>
+        <p:cNvGrpSpPr/>
+        <p:nvPr/>
+      </p:nvGrpSpPr>
+      <p:grpSpPr>
+        <a:xfrm>
+          <a:off x="0" y="0"/>
+          <a:ext cx="0" cy="0"/>
+          <a:chOff x="0" y="0"/>
+          <a:chExt cx="0" cy="0"/>
+        </a:xfrm>
+      </p:grpSpPr>
+      <p:sp>
+        <p:nvSpPr>
+          <p:cNvPr id="2" name="Title 1">
+            <a:extLst>
+              <a:ext uri="{FF2B5EF4-FFF2-40B4-BE49-F238E27FC236}">
+                <a16:creationId xmlns:a16="http://schemas.microsoft.com/office/drawing/2014/main" id="{72BA6B0D-7D5A-EEFD-C222-4D339EF8BF53}"/>
+              </a:ext>
+            </a:extLst>
+          </p:cNvPr>
+          <p:cNvSpPr>
+            <a:spLocks noGrp="1"/>
+          </p:cNvSpPr>
+          <p:nvPr>
+            <p:ph type="title"/>
+          </p:nvPr>
+        </p:nvSpPr>
+        <p:spPr/>
+        <p:txBody>
+          <a:bodyPr/>
+          <a:lstStyle/>
+          <a:p>
+            <a:r>
+              <a:rPr lang="en-US" dirty="0"/>
+              <a:t>Heap – Insertion </a:t>
+            </a:r>
+          </a:p>
+        </p:txBody>
+      </p:sp>
+      <p:sp>
+        <p:nvSpPr>
+          <p:cNvPr id="3" name="Content Placeholder 2">
+            <a:extLst>
+              <a:ext uri="{FF2B5EF4-FFF2-40B4-BE49-F238E27FC236}">
+                <a16:creationId xmlns:a16="http://schemas.microsoft.com/office/drawing/2014/main" id="{8829B7A1-1412-D202-EE0F-F69B92F815DF}"/>
+              </a:ext>
+            </a:extLst>
+          </p:cNvPr>
+          <p:cNvSpPr>
+            <a:spLocks noGrp="1"/>
+          </p:cNvSpPr>
+          <p:nvPr>
+            <p:ph idx="1"/>
+          </p:nvPr>
+        </p:nvSpPr>
+        <p:spPr/>
+        <p:txBody>
+          <a:bodyPr/>
+          <a:lstStyle/>
+          <a:p>
+            <a:r>
+              <a:rPr lang="en-US" dirty="0"/>
+              <a:t>Insert latest item in bottommost, leftmost position.</a:t>
+            </a:r>
+          </a:p>
+          <a:p>
+            <a:r>
+              <a:rPr lang="en-US" dirty="0"/>
+              <a:t>"Bubble up" if necessary.</a:t>
+            </a:r>
+          </a:p>
+          <a:p>
+            <a:pPr lvl="1"/>
+            <a:r>
+              <a:rPr lang="en-US" dirty="0"/>
+              <a:t>Swap the item with its parent until heap property is not violated</a:t>
+            </a:r>
+          </a:p>
+          <a:p>
+            <a:pPr lvl="1"/>
+            <a:r>
+              <a:rPr lang="en-US" dirty="0"/>
+              <a:t>Also called "</a:t>
+            </a:r>
+            <a:r>
+              <a:rPr lang="en-US" dirty="0" err="1"/>
+              <a:t>heapify</a:t>
+            </a:r>
+            <a:r>
+              <a:rPr lang="en-US" dirty="0"/>
+              <a:t>", sometimes "</a:t>
+            </a:r>
+            <a:r>
+              <a:rPr lang="en-US" dirty="0" err="1"/>
+              <a:t>heapify</a:t>
+            </a:r>
+            <a:r>
+              <a:rPr lang="en-US" dirty="0"/>
+              <a:t> up"</a:t>
+            </a:r>
+          </a:p>
+        </p:txBody>
+      </p:sp>
+    </p:spTree>
+    <p:extLst>
+      <p:ext uri="{BB962C8B-B14F-4D97-AF65-F5344CB8AC3E}">
+        <p14:creationId xmlns:p14="http://schemas.microsoft.com/office/powerpoint/2010/main" val="4214698611"/>
+      </p:ext>
+    </p:extLst>
+  </p:cSld>
+  <p:clrMapOvr>
+    <a:masterClrMapping/>
+  </p:clrMapOvr>
+</p:sld>
+</file>
+
+<file path=ppt/slides/slide34.xml><?xml version="1.0" encoding="utf-8"?>
+<p:sld xmlns:a="http://schemas.openxmlformats.org/drawingml/2006/main" xmlns:r="http://schemas.openxmlformats.org/officeDocument/2006/relationships" xmlns:p="http://schemas.openxmlformats.org/presentationml/2006/main">
+  <p:cSld>
+    <p:spTree>
+      <p:nvGrpSpPr>
+        <p:cNvPr id="1" name=""/>
+        <p:cNvGrpSpPr/>
+        <p:nvPr/>
+      </p:nvGrpSpPr>
+      <p:grpSpPr>
+        <a:xfrm>
+          <a:off x="0" y="0"/>
+          <a:ext cx="0" cy="0"/>
+          <a:chOff x="0" y="0"/>
+          <a:chExt cx="0" cy="0"/>
+        </a:xfrm>
+      </p:grpSpPr>
+      <p:sp>
+        <p:nvSpPr>
+          <p:cNvPr id="2" name="Title 1">
+            <a:extLst>
+              <a:ext uri="{FF2B5EF4-FFF2-40B4-BE49-F238E27FC236}">
+                <a16:creationId xmlns:a16="http://schemas.microsoft.com/office/drawing/2014/main" id="{079AC2F7-5EB7-8F96-4C5B-1EF2720C8419}"/>
+              </a:ext>
+            </a:extLst>
+          </p:cNvPr>
+          <p:cNvSpPr>
+            <a:spLocks noGrp="1"/>
+          </p:cNvSpPr>
+          <p:nvPr>
+            <p:ph type="title"/>
+          </p:nvPr>
+        </p:nvSpPr>
+        <p:spPr>
+          <a:xfrm>
+            <a:off x="236483" y="365125"/>
+            <a:ext cx="11824137" cy="1325563"/>
+          </a:xfrm>
+        </p:spPr>
+        <p:txBody>
+          <a:bodyPr>
+            <a:normAutofit fontScale="90000"/>
+          </a:bodyPr>
+          <a:lstStyle/>
+          <a:p>
+            <a:r>
+              <a:rPr lang="en-US" dirty="0"/>
+              <a:t>Example: Insert the following numbers into a min-heap. </a:t>
+            </a:r>
+            <a:br>
+              <a:rPr lang="en-US" dirty="0"/>
+            </a:br>
+            <a:r>
+              <a:rPr lang="en-US" dirty="0"/>
+              <a:t>18, 12, 3, 7, 15, 4, 11, 16, 5, 14. </a:t>
+            </a:r>
+            <a:br>
+              <a:rPr lang="en-US" dirty="0"/>
+            </a:br>
+            <a:r>
+              <a:rPr lang="en-US" dirty="0"/>
+              <a:t>Then draw the array.</a:t>
+            </a:r>
+          </a:p>
+        </p:txBody>
+      </p:sp>
+    </p:spTree>
+    <p:extLst>
+      <p:ext uri="{BB962C8B-B14F-4D97-AF65-F5344CB8AC3E}">
+        <p14:creationId xmlns:p14="http://schemas.microsoft.com/office/powerpoint/2010/main" val="3887871818"/>
+      </p:ext>
+    </p:extLst>
+  </p:cSld>
+  <p:clrMapOvr>
+    <a:masterClrMapping/>
+  </p:clrMapOvr>
+</p:sld>
+</file>
+
+<file path=ppt/slides/slide35.xml><?xml version="1.0" encoding="utf-8"?>
+<p:sld xmlns:a="http://schemas.openxmlformats.org/drawingml/2006/main" xmlns:r="http://schemas.openxmlformats.org/officeDocument/2006/relationships" xmlns:p="http://schemas.openxmlformats.org/presentationml/2006/main">
+  <p:cSld>
+    <p:spTree>
+      <p:nvGrpSpPr>
+        <p:cNvPr id="1" name=""/>
+        <p:cNvGrpSpPr/>
+        <p:nvPr/>
+      </p:nvGrpSpPr>
+      <p:grpSpPr>
+        <a:xfrm>
+          <a:off x="0" y="0"/>
+          <a:ext cx="0" cy="0"/>
+          <a:chOff x="0" y="0"/>
+          <a:chExt cx="0" cy="0"/>
+        </a:xfrm>
+      </p:grpSpPr>
+    </p:spTree>
+    <p:extLst>
+      <p:ext uri="{BB962C8B-B14F-4D97-AF65-F5344CB8AC3E}">
+        <p14:creationId xmlns:p14="http://schemas.microsoft.com/office/powerpoint/2010/main" val="1931408223"/>
+      </p:ext>
+    </p:extLst>
+  </p:cSld>
+  <p:clrMapOvr>
+    <a:masterClrMapping/>
+  </p:clrMapOvr>
+</p:sld>
+</file>
+
+<file path=ppt/slides/slide36.xml><?xml version="1.0" encoding="utf-8"?>
+<p:sld xmlns:a="http://schemas.openxmlformats.org/drawingml/2006/main" xmlns:r="http://schemas.openxmlformats.org/officeDocument/2006/relationships" xmlns:p="http://schemas.openxmlformats.org/presentationml/2006/main">
+  <p:cSld>
+    <p:spTree>
+      <p:nvGrpSpPr>
+        <p:cNvPr id="1" name=""/>
+        <p:cNvGrpSpPr/>
+        <p:nvPr/>
+      </p:nvGrpSpPr>
+      <p:grpSpPr>
+        <a:xfrm>
+          <a:off x="0" y="0"/>
+          <a:ext cx="0" cy="0"/>
+          <a:chOff x="0" y="0"/>
+          <a:chExt cx="0" cy="0"/>
+        </a:xfrm>
+      </p:grpSpPr>
+      <p:sp>
+        <p:nvSpPr>
+          <p:cNvPr id="2" name="Title 1">
+            <a:extLst>
+              <a:ext uri="{FF2B5EF4-FFF2-40B4-BE49-F238E27FC236}">
+                <a16:creationId xmlns:a16="http://schemas.microsoft.com/office/drawing/2014/main" id="{A7852802-1485-C855-7482-E8B8EC00D302}"/>
+              </a:ext>
+            </a:extLst>
+          </p:cNvPr>
+          <p:cNvSpPr>
+            <a:spLocks noGrp="1"/>
+          </p:cNvSpPr>
+          <p:nvPr>
+            <p:ph type="title"/>
+          </p:nvPr>
+        </p:nvSpPr>
+        <p:spPr/>
+        <p:txBody>
+          <a:bodyPr/>
+          <a:lstStyle/>
+          <a:p>
+            <a:r>
+              <a:rPr lang="en-US" dirty="0"/>
+              <a:t>Heap – Deletion </a:t>
+            </a:r>
+          </a:p>
+        </p:txBody>
+      </p:sp>
+      <p:sp>
+        <p:nvSpPr>
+          <p:cNvPr id="3" name="Content Placeholder 2">
+            <a:extLst>
+              <a:ext uri="{FF2B5EF4-FFF2-40B4-BE49-F238E27FC236}">
+                <a16:creationId xmlns:a16="http://schemas.microsoft.com/office/drawing/2014/main" id="{6AA11BEF-2CD3-69EF-8E1D-B9682B0B7CF6}"/>
+              </a:ext>
+            </a:extLst>
+          </p:cNvPr>
+          <p:cNvSpPr>
+            <a:spLocks noGrp="1"/>
+          </p:cNvSpPr>
+          <p:nvPr>
+            <p:ph idx="1"/>
+          </p:nvPr>
+        </p:nvSpPr>
+        <p:spPr/>
+        <p:txBody>
+          <a:bodyPr/>
+          <a:lstStyle/>
+          <a:p>
+            <a:r>
+              <a:rPr lang="en-US" dirty="0"/>
+              <a:t>Remove the item at the root</a:t>
+            </a:r>
+          </a:p>
+          <a:p>
+            <a:r>
+              <a:rPr lang="en-US" dirty="0"/>
+              <a:t>Move the "last" thing in the heap to the root</a:t>
+            </a:r>
+          </a:p>
+          <a:p>
+            <a:r>
+              <a:rPr lang="en-US" dirty="0"/>
+              <a:t>"Bubble down" if necessary.</a:t>
+            </a:r>
+          </a:p>
+          <a:p>
+            <a:pPr lvl="1"/>
+            <a:r>
+              <a:rPr lang="en-US" dirty="0"/>
+              <a:t>Check the children. </a:t>
+            </a:r>
+          </a:p>
+          <a:p>
+            <a:pPr lvl="1"/>
+            <a:r>
+              <a:rPr lang="en-US" dirty="0"/>
+              <a:t>Swap the item with the smaller of the children </a:t>
+            </a:r>
+          </a:p>
+          <a:p>
+            <a:pPr lvl="1"/>
+            <a:r>
+              <a:rPr lang="en-US" dirty="0"/>
+              <a:t>Continue swapping item down, so the smaller thing gets swapped up.</a:t>
+            </a:r>
+          </a:p>
+          <a:p>
+            <a:pPr lvl="1"/>
+            <a:r>
+              <a:rPr lang="en-US" dirty="0"/>
+              <a:t>Also called "</a:t>
+            </a:r>
+            <a:r>
+              <a:rPr lang="en-US" dirty="0" err="1"/>
+              <a:t>heapify</a:t>
+            </a:r>
+            <a:r>
+              <a:rPr lang="en-US" dirty="0"/>
+              <a:t>", sometimes "</a:t>
+            </a:r>
+            <a:r>
+              <a:rPr lang="en-US" dirty="0" err="1"/>
+              <a:t>heapify</a:t>
+            </a:r>
+            <a:r>
+              <a:rPr lang="en-US" dirty="0"/>
+              <a:t> down"</a:t>
+            </a:r>
+          </a:p>
+          <a:p>
+            <a:endParaRPr lang="en-US" dirty="0"/>
+          </a:p>
+        </p:txBody>
+      </p:sp>
+    </p:spTree>
+    <p:extLst>
+      <p:ext uri="{BB962C8B-B14F-4D97-AF65-F5344CB8AC3E}">
+        <p14:creationId xmlns:p14="http://schemas.microsoft.com/office/powerpoint/2010/main" val="2360243750"/>
+      </p:ext>
+    </p:extLst>
+  </p:cSld>
+  <p:clrMapOvr>
+    <a:masterClrMapping/>
+  </p:clrMapOvr>
+</p:sld>
+</file>
+
+<file path=ppt/slides/slide37.xml><?xml version="1.0" encoding="utf-8"?>
+<p:sld xmlns:a="http://schemas.openxmlformats.org/drawingml/2006/main" xmlns:r="http://schemas.openxmlformats.org/officeDocument/2006/relationships" xmlns:p="http://schemas.openxmlformats.org/presentationml/2006/main">
+  <p:cSld>
+    <p:spTree>
+      <p:nvGrpSpPr>
+        <p:cNvPr id="1" name=""/>
+        <p:cNvGrpSpPr/>
+        <p:nvPr/>
+      </p:nvGrpSpPr>
+      <p:grpSpPr>
+        <a:xfrm>
+          <a:off x="0" y="0"/>
+          <a:ext cx="0" cy="0"/>
+          <a:chOff x="0" y="0"/>
+          <a:chExt cx="0" cy="0"/>
+        </a:xfrm>
+      </p:grpSpPr>
+      <p:sp>
+        <p:nvSpPr>
+          <p:cNvPr id="2" name="Title 1">
+            <a:extLst>
+              <a:ext uri="{FF2B5EF4-FFF2-40B4-BE49-F238E27FC236}">
+                <a16:creationId xmlns:a16="http://schemas.microsoft.com/office/drawing/2014/main" id="{314A0BD7-EAAF-9DB1-2181-379C1316B9B4}"/>
+              </a:ext>
+            </a:extLst>
+          </p:cNvPr>
+          <p:cNvSpPr>
+            <a:spLocks noGrp="1"/>
+          </p:cNvSpPr>
+          <p:nvPr>
+            <p:ph type="title"/>
+          </p:nvPr>
+        </p:nvSpPr>
+        <p:spPr/>
+        <p:txBody>
+          <a:bodyPr/>
+          <a:lstStyle/>
+          <a:p>
+            <a:r>
+              <a:rPr lang="en-US" dirty="0"/>
+              <a:t>Remove 2 things from the preceding heap.</a:t>
+            </a:r>
+          </a:p>
+        </p:txBody>
+      </p:sp>
+    </p:spTree>
+    <p:extLst>
+      <p:ext uri="{BB962C8B-B14F-4D97-AF65-F5344CB8AC3E}">
+        <p14:creationId xmlns:p14="http://schemas.microsoft.com/office/powerpoint/2010/main" val="1158584789"/>
+      </p:ext>
+    </p:extLst>
+  </p:cSld>
+  <p:clrMapOvr>
+    <a:masterClrMapping/>
+  </p:clrMapOvr>
+</p:sld>
+</file>
+
+<file path=ppt/slides/slide38.xml><?xml version="1.0" encoding="utf-8"?>
+<p:sld xmlns:a="http://schemas.openxmlformats.org/drawingml/2006/main" xmlns:r="http://schemas.openxmlformats.org/officeDocument/2006/relationships" xmlns:p="http://schemas.openxmlformats.org/presentationml/2006/main">
+  <p:cSld>
+    <p:spTree>
+      <p:nvGrpSpPr>
+        <p:cNvPr id="1" name=""/>
+        <p:cNvGrpSpPr/>
+        <p:nvPr/>
+      </p:nvGrpSpPr>
+      <p:grpSpPr>
+        <a:xfrm>
+          <a:off x="0" y="0"/>
+          <a:ext cx="0" cy="0"/>
+          <a:chOff x="0" y="0"/>
+          <a:chExt cx="0" cy="0"/>
+        </a:xfrm>
+      </p:grpSpPr>
+    </p:spTree>
+    <p:extLst>
+      <p:ext uri="{BB962C8B-B14F-4D97-AF65-F5344CB8AC3E}">
+        <p14:creationId xmlns:p14="http://schemas.microsoft.com/office/powerpoint/2010/main" val="2920363813"/>
+      </p:ext>
+    </p:extLst>
+  </p:cSld>
+  <p:clrMapOvr>
+    <a:masterClrMapping/>
+  </p:clrMapOvr>
+</p:sld>
+</file>
+
+<file path=ppt/slides/slide39.xml><?xml version="1.0" encoding="utf-8"?>
+<p:sld xmlns:a="http://schemas.openxmlformats.org/drawingml/2006/main" xmlns:r="http://schemas.openxmlformats.org/officeDocument/2006/relationships" xmlns:p="http://schemas.openxmlformats.org/presentationml/2006/main">
+  <p:cSld>
+    <p:spTree>
+      <p:nvGrpSpPr>
+        <p:cNvPr id="1" name=""/>
+        <p:cNvGrpSpPr/>
+        <p:nvPr/>
+      </p:nvGrpSpPr>
+      <p:grpSpPr>
+        <a:xfrm>
+          <a:off x="0" y="0"/>
+          <a:ext cx="0" cy="0"/>
+          <a:chOff x="0" y="0"/>
+          <a:chExt cx="0" cy="0"/>
+        </a:xfrm>
+      </p:grpSpPr>
+      <p:sp>
+        <p:nvSpPr>
+          <p:cNvPr id="2" name="Title 1">
+            <a:extLst>
+              <a:ext uri="{FF2B5EF4-FFF2-40B4-BE49-F238E27FC236}">
+                <a16:creationId xmlns:a16="http://schemas.microsoft.com/office/drawing/2014/main" id="{9C5AF9A8-21AC-F586-25F7-E4D2698FD2C2}"/>
+              </a:ext>
+            </a:extLst>
+          </p:cNvPr>
+          <p:cNvSpPr>
+            <a:spLocks noGrp="1"/>
+          </p:cNvSpPr>
+          <p:nvPr>
+            <p:ph type="title"/>
+          </p:nvPr>
+        </p:nvSpPr>
+        <p:spPr/>
+        <p:txBody>
+          <a:bodyPr/>
+          <a:lstStyle/>
+          <a:p>
+            <a:r>
+              <a:rPr lang="en-US" dirty="0"/>
+              <a:t>Heaps – that's great, but how does it code???</a:t>
+            </a:r>
+          </a:p>
+        </p:txBody>
+      </p:sp>
+      <mc:AlternateContent xmlns:mc="http://schemas.openxmlformats.org/markup-compatibility/2006">
+        <mc:Choice xmlns:a14="http://schemas.microsoft.com/office/drawing/2010/main" Requires="a14">
+          <p:sp>
+            <p:nvSpPr>
+              <p:cNvPr id="3" name="Content Placeholder 2">
+                <a:extLst>
+                  <a:ext uri="{FF2B5EF4-FFF2-40B4-BE49-F238E27FC236}">
+                    <a16:creationId xmlns:a16="http://schemas.microsoft.com/office/drawing/2014/main" id="{0329BA7F-9CDA-E2B8-74FC-DDD79CBC9799}"/>
+                  </a:ext>
+                </a:extLst>
+              </p:cNvPr>
+              <p:cNvSpPr>
+                <a:spLocks noGrp="1"/>
+              </p:cNvSpPr>
+              <p:nvPr>
+                <p:ph idx="1"/>
+              </p:nvPr>
+            </p:nvSpPr>
+            <p:spPr/>
+            <p:txBody>
+              <a:bodyPr/>
+              <a:lstStyle/>
+              <a:p>
+                <a:r>
+                  <a:rPr lang="en-US" dirty="0"/>
+                  <a:t>Heaps use binary trees</a:t>
+                </a:r>
+              </a:p>
+              <a:p>
+                <a:r>
+                  <a:rPr lang="en-US" dirty="0"/>
+                  <a:t>Stored in an array with level order</a:t>
+                </a:r>
+              </a:p>
+              <a:p>
+                <a:pPr lvl="1"/>
+                <a:r>
+                  <a:rPr lang="en-US" dirty="0"/>
+                  <a:t>Index 0=minimum</a:t>
+                </a:r>
+              </a:p>
+              <a:p>
+                <a:pPr lvl="1"/>
+                <a:r>
+                  <a:rPr lang="en-US" dirty="0"/>
+                  <a:t>For a given index </a:t>
+                </a:r>
+                <a14:m>
+                  <m:oMath xmlns:m="http://schemas.openxmlformats.org/officeDocument/2006/math">
+                    <m:r>
+                      <a:rPr lang="en-US" i="1" dirty="0" smtClean="0">
+                        <a:latin typeface="Cambria Math" panose="02040503050406030204" pitchFamily="18" charset="0"/>
+                      </a:rPr>
+                      <m:t>𝑖</m:t>
+                    </m:r>
+                  </m:oMath>
+                </a14:m>
+                <a:r>
+                  <a:rPr lang="en-US" dirty="0"/>
+                  <a:t>,  </a:t>
+                </a:r>
+              </a:p>
+              <a:p>
+                <a:pPr lvl="2"/>
+                <a:r>
+                  <a:rPr lang="en-US" dirty="0"/>
+                  <a:t>Parent node is located at  </a:t>
+                </a:r>
+                <a14:m>
+                  <m:oMath xmlns:m="http://schemas.openxmlformats.org/officeDocument/2006/math">
+                    <m:f>
+                      <m:fPr>
+                        <m:ctrlPr>
+                          <a:rPr lang="en-US" i="1" dirty="0" smtClean="0">
+                            <a:latin typeface="Cambria Math" panose="02040503050406030204" pitchFamily="18" charset="0"/>
+                          </a:rPr>
+                        </m:ctrlPr>
+                      </m:fPr>
+                      <m:num>
+                        <m:r>
+                          <m:rPr>
+                            <m:sty m:val="p"/>
+                          </m:rPr>
+                          <a:rPr lang="en-US" b="0" i="1" dirty="0" smtClean="0">
+                            <a:latin typeface="Cambria Math" panose="02040503050406030204" pitchFamily="18" charset="0"/>
+                          </a:rPr>
+                          <m:t>i</m:t>
+                        </m:r>
+                        <m:r>
+                          <a:rPr lang="en-US" b="0" i="1" dirty="0" smtClean="0">
+                            <a:latin typeface="Cambria Math" panose="02040503050406030204" pitchFamily="18" charset="0"/>
+                          </a:rPr>
+                          <m:t>-2</m:t>
+                        </m:r>
+                      </m:num>
+                      <m:den>
+                        <m:r>
+                          <a:rPr lang="en-US" b="0" i="1" dirty="0" smtClean="0">
+                            <a:latin typeface="Cambria Math" panose="02040503050406030204" pitchFamily="18" charset="0"/>
+                          </a:rPr>
+                          <m:t>2</m:t>
+                        </m:r>
+                      </m:den>
+                    </m:f>
+                  </m:oMath>
+                </a14:m>
+                <a:endParaRPr lang="en-US" dirty="0"/>
+              </a:p>
+              <a:p>
+                <a:pPr lvl="2"/>
+                <a:r>
+                  <a:rPr lang="en-US" dirty="0"/>
+                  <a:t>Left child is located at </a:t>
+                </a:r>
+                <a14:m>
+                  <m:oMath xmlns:m="http://schemas.openxmlformats.org/officeDocument/2006/math">
+                    <m:r>
+                      <a:rPr lang="en-US" b="0" i="1" smtClean="0">
+                        <a:latin typeface="Cambria Math" panose="02040503050406030204" pitchFamily="18" charset="0"/>
+                      </a:rPr>
+                      <m:t>2</m:t>
+                    </m:r>
+                    <m:r>
+                      <a:rPr lang="en-US" b="0" i="1" smtClean="0">
+                        <a:latin typeface="Cambria Math" panose="02040503050406030204" pitchFamily="18" charset="0"/>
+                      </a:rPr>
+                      <m:t>𝑖</m:t>
+                    </m:r>
+                    <m:r>
+                      <a:rPr lang="en-US" b="0" i="1" smtClean="0">
+                        <a:latin typeface="Cambria Math" panose="02040503050406030204" pitchFamily="18" charset="0"/>
+                      </a:rPr>
+                      <m:t> +1</m:t>
+                    </m:r>
+                  </m:oMath>
+                </a14:m>
+                <a:endParaRPr lang="en-US" b="0" dirty="0"/>
+              </a:p>
+              <a:p>
+                <a:pPr lvl="2"/>
+                <a:r>
+                  <a:rPr lang="en-US" dirty="0"/>
+                  <a:t>Right child is located at </a:t>
+                </a:r>
+                <a14:m>
+                  <m:oMath xmlns:m="http://schemas.openxmlformats.org/officeDocument/2006/math">
+                    <m:r>
+                      <a:rPr lang="en-US" i="1">
+                        <a:latin typeface="Cambria Math" panose="02040503050406030204" pitchFamily="18" charset="0"/>
+                      </a:rPr>
+                      <m:t>2</m:t>
+                    </m:r>
+                    <m:r>
+                      <a:rPr lang="en-US" i="1">
+                        <a:latin typeface="Cambria Math" panose="02040503050406030204" pitchFamily="18" charset="0"/>
+                      </a:rPr>
+                      <m:t>𝑖</m:t>
+                    </m:r>
+                    <m:r>
+                      <a:rPr lang="en-US" i="1">
+                        <a:latin typeface="Cambria Math" panose="02040503050406030204" pitchFamily="18" charset="0"/>
+                      </a:rPr>
+                      <m:t> +2</m:t>
+                    </m:r>
+                  </m:oMath>
+                </a14:m>
+                <a:endParaRPr lang="en-US" dirty="0"/>
+              </a:p>
+              <a:p>
+                <a:pPr lvl="2"/>
+                <a:endParaRPr lang="en-US" dirty="0"/>
+              </a:p>
+              <a:p>
+                <a:pPr lvl="2"/>
+                <a:endParaRPr lang="en-US" dirty="0"/>
+              </a:p>
+            </p:txBody>
+          </p:sp>
+        </mc:Choice>
+        <mc:Fallback>
+          <p:sp>
+            <p:nvSpPr>
+              <p:cNvPr id="3" name="Content Placeholder 2">
+                <a:extLst>
+                  <a:ext uri="{FF2B5EF4-FFF2-40B4-BE49-F238E27FC236}">
+                    <a16:creationId xmlns:a16="http://schemas.microsoft.com/office/drawing/2014/main" id="{0329BA7F-9CDA-E2B8-74FC-DDD79CBC9799}"/>
+                  </a:ext>
+                </a:extLst>
+              </p:cNvPr>
+              <p:cNvSpPr>
+                <a:spLocks noGrp="1" noRot="1" noChangeAspect="1" noMove="1" noResize="1" noEditPoints="1" noAdjustHandles="1" noChangeArrowheads="1" noChangeShapeType="1" noTextEdit="1"/>
+              </p:cNvSpPr>
+              <p:nvPr>
+                <p:ph idx="1"/>
+              </p:nvPr>
+            </p:nvSpPr>
+            <p:spPr>
+              <a:blipFill>
+                <a:blip r:embed="rId2"/>
+                <a:stretch>
+                  <a:fillRect l="-1086" t="-2326"/>
+                </a:stretch>
+              </a:blipFill>
+            </p:spPr>
+            <p:txBody>
+              <a:bodyPr/>
+              <a:lstStyle/>
+              <a:p>
+                <a:r>
+                  <a:rPr lang="en-US">
+                    <a:noFill/>
+                  </a:rPr>
+                  <a:t> </a:t>
+                </a:r>
+              </a:p>
+            </p:txBody>
+          </p:sp>
+        </mc:Fallback>
+      </mc:AlternateContent>
+    </p:spTree>
+    <p:extLst>
+      <p:ext uri="{BB962C8B-B14F-4D97-AF65-F5344CB8AC3E}">
+        <p14:creationId xmlns:p14="http://schemas.microsoft.com/office/powerpoint/2010/main" val="2254374803"/>
       </p:ext>
     </p:extLst>
   </p:cSld>
@@ -7376,6 +8675,988 @@
     <p:extLst>
       <p:ext uri="{BB962C8B-B14F-4D97-AF65-F5344CB8AC3E}">
         <p14:creationId xmlns:p14="http://schemas.microsoft.com/office/powerpoint/2010/main" val="3285122766"/>
+      </p:ext>
+    </p:extLst>
+  </p:cSld>
+  <p:clrMapOvr>
+    <a:masterClrMapping/>
+  </p:clrMapOvr>
+</p:sld>
+</file>
+
+<file path=ppt/slides/slide40.xml><?xml version="1.0" encoding="utf-8"?>
+<p:sld xmlns:a="http://schemas.openxmlformats.org/drawingml/2006/main" xmlns:r="http://schemas.openxmlformats.org/officeDocument/2006/relationships" xmlns:p="http://schemas.openxmlformats.org/presentationml/2006/main">
+  <p:cSld>
+    <p:spTree>
+      <p:nvGrpSpPr>
+        <p:cNvPr id="1" name=""/>
+        <p:cNvGrpSpPr/>
+        <p:nvPr/>
+      </p:nvGrpSpPr>
+      <p:grpSpPr>
+        <a:xfrm>
+          <a:off x="0" y="0"/>
+          <a:ext cx="0" cy="0"/>
+          <a:chOff x="0" y="0"/>
+          <a:chExt cx="0" cy="0"/>
+        </a:xfrm>
+      </p:grpSpPr>
+      <p:sp>
+        <p:nvSpPr>
+          <p:cNvPr id="2" name="Title 1">
+            <a:extLst>
+              <a:ext uri="{FF2B5EF4-FFF2-40B4-BE49-F238E27FC236}">
+                <a16:creationId xmlns:a16="http://schemas.microsoft.com/office/drawing/2014/main" id="{3D1C5025-8009-2E50-91E0-34644915EDA2}"/>
+              </a:ext>
+            </a:extLst>
+          </p:cNvPr>
+          <p:cNvSpPr>
+            <a:spLocks noGrp="1"/>
+          </p:cNvSpPr>
+          <p:nvPr>
+            <p:ph type="title"/>
+          </p:nvPr>
+        </p:nvSpPr>
+        <p:spPr/>
+        <p:txBody>
+          <a:bodyPr/>
+          <a:lstStyle/>
+          <a:p>
+            <a:r>
+              <a:rPr lang="en-US" dirty="0"/>
+              <a:t>Heap – Search </a:t>
+            </a:r>
+          </a:p>
+        </p:txBody>
+      </p:sp>
+      <p:sp>
+        <p:nvSpPr>
+          <p:cNvPr id="3" name="Content Placeholder 2">
+            <a:extLst>
+              <a:ext uri="{FF2B5EF4-FFF2-40B4-BE49-F238E27FC236}">
+                <a16:creationId xmlns:a16="http://schemas.microsoft.com/office/drawing/2014/main" id="{43638446-3449-C539-2539-04DB5DE31DFC}"/>
+              </a:ext>
+            </a:extLst>
+          </p:cNvPr>
+          <p:cNvSpPr>
+            <a:spLocks noGrp="1"/>
+          </p:cNvSpPr>
+          <p:nvPr>
+            <p:ph idx="1"/>
+          </p:nvPr>
+        </p:nvSpPr>
+        <p:spPr/>
+        <p:txBody>
+          <a:bodyPr/>
+          <a:lstStyle/>
+          <a:p>
+            <a:r>
+              <a:rPr lang="en-US" dirty="0" err="1"/>
+              <a:t>Ehhh</a:t>
+            </a:r>
+            <a:r>
+              <a:rPr lang="en-US" dirty="0"/>
+              <a:t> not really</a:t>
+            </a:r>
+          </a:p>
+          <a:p>
+            <a:r>
+              <a:rPr lang="en-US" dirty="0"/>
+              <a:t>Used to find the *min* element </a:t>
+            </a:r>
+          </a:p>
+          <a:p>
+            <a:r>
+              <a:rPr lang="en-US" dirty="0"/>
+              <a:t>So don't worry about it!</a:t>
+            </a:r>
+          </a:p>
+        </p:txBody>
+      </p:sp>
+    </p:spTree>
+    <p:extLst>
+      <p:ext uri="{BB962C8B-B14F-4D97-AF65-F5344CB8AC3E}">
+        <p14:creationId xmlns:p14="http://schemas.microsoft.com/office/powerpoint/2010/main" val="1941977360"/>
+      </p:ext>
+    </p:extLst>
+  </p:cSld>
+  <p:clrMapOvr>
+    <a:masterClrMapping/>
+  </p:clrMapOvr>
+</p:sld>
+</file>
+
+<file path=ppt/slides/slide41.xml><?xml version="1.0" encoding="utf-8"?>
+<p:sld xmlns:a="http://schemas.openxmlformats.org/drawingml/2006/main" xmlns:r="http://schemas.openxmlformats.org/officeDocument/2006/relationships" xmlns:p="http://schemas.openxmlformats.org/presentationml/2006/main">
+  <p:cSld>
+    <p:spTree>
+      <p:nvGrpSpPr>
+        <p:cNvPr id="1" name=""/>
+        <p:cNvGrpSpPr/>
+        <p:nvPr/>
+      </p:nvGrpSpPr>
+      <p:grpSpPr>
+        <a:xfrm>
+          <a:off x="0" y="0"/>
+          <a:ext cx="0" cy="0"/>
+          <a:chOff x="0" y="0"/>
+          <a:chExt cx="0" cy="0"/>
+        </a:xfrm>
+      </p:grpSpPr>
+      <p:sp>
+        <p:nvSpPr>
+          <p:cNvPr id="4" name="Title 3">
+            <a:extLst>
+              <a:ext uri="{FF2B5EF4-FFF2-40B4-BE49-F238E27FC236}">
+                <a16:creationId xmlns:a16="http://schemas.microsoft.com/office/drawing/2014/main" id="{0941AB58-5C15-39E1-2823-754654D218F0}"/>
+              </a:ext>
+            </a:extLst>
+          </p:cNvPr>
+          <p:cNvSpPr>
+            <a:spLocks noGrp="1"/>
+          </p:cNvSpPr>
+          <p:nvPr>
+            <p:ph type="title"/>
+          </p:nvPr>
+        </p:nvSpPr>
+        <p:spPr/>
+        <p:txBody>
+          <a:bodyPr/>
+          <a:lstStyle/>
+          <a:p>
+            <a:r>
+              <a:rPr lang="en-US" dirty="0"/>
+              <a:t>What do we use heaps for?</a:t>
+            </a:r>
+          </a:p>
+        </p:txBody>
+      </p:sp>
+      <p:sp>
+        <p:nvSpPr>
+          <p:cNvPr id="5" name="Content Placeholder 4">
+            <a:extLst>
+              <a:ext uri="{FF2B5EF4-FFF2-40B4-BE49-F238E27FC236}">
+                <a16:creationId xmlns:a16="http://schemas.microsoft.com/office/drawing/2014/main" id="{297D480D-D907-4306-6BD5-715863E3D977}"/>
+              </a:ext>
+            </a:extLst>
+          </p:cNvPr>
+          <p:cNvSpPr>
+            <a:spLocks noGrp="1"/>
+          </p:cNvSpPr>
+          <p:nvPr>
+            <p:ph idx="1"/>
+          </p:nvPr>
+        </p:nvSpPr>
+        <p:spPr/>
+        <p:txBody>
+          <a:bodyPr/>
+          <a:lstStyle/>
+          <a:p>
+            <a:r>
+              <a:rPr lang="en-US" dirty="0"/>
+              <a:t>Priority queues!</a:t>
+            </a:r>
+          </a:p>
+          <a:p>
+            <a:r>
+              <a:rPr lang="en-US" dirty="0"/>
+              <a:t>Min-heap removal always gives the minimum element.</a:t>
+            </a:r>
+          </a:p>
+        </p:txBody>
+      </p:sp>
+    </p:spTree>
+    <p:extLst>
+      <p:ext uri="{BB962C8B-B14F-4D97-AF65-F5344CB8AC3E}">
+        <p14:creationId xmlns:p14="http://schemas.microsoft.com/office/powerpoint/2010/main" val="294509255"/>
+      </p:ext>
+    </p:extLst>
+  </p:cSld>
+  <p:clrMapOvr>
+    <a:masterClrMapping/>
+  </p:clrMapOvr>
+</p:sld>
+</file>
+
+<file path=ppt/slides/slide42.xml><?xml version="1.0" encoding="utf-8"?>
+<p:sld xmlns:a="http://schemas.openxmlformats.org/drawingml/2006/main" xmlns:r="http://schemas.openxmlformats.org/officeDocument/2006/relationships" xmlns:p="http://schemas.openxmlformats.org/presentationml/2006/main">
+  <p:cSld>
+    <p:spTree>
+      <p:nvGrpSpPr>
+        <p:cNvPr id="1" name=""/>
+        <p:cNvGrpSpPr/>
+        <p:nvPr/>
+      </p:nvGrpSpPr>
+      <p:grpSpPr>
+        <a:xfrm>
+          <a:off x="0" y="0"/>
+          <a:ext cx="0" cy="0"/>
+          <a:chOff x="0" y="0"/>
+          <a:chExt cx="0" cy="0"/>
+        </a:xfrm>
+      </p:grpSpPr>
+      <p:sp>
+        <p:nvSpPr>
+          <p:cNvPr id="2" name="Title 1">
+            <a:extLst>
+              <a:ext uri="{FF2B5EF4-FFF2-40B4-BE49-F238E27FC236}">
+                <a16:creationId xmlns:a16="http://schemas.microsoft.com/office/drawing/2014/main" id="{FD8E9166-8492-70E6-BC59-9B3604D3291E}"/>
+              </a:ext>
+            </a:extLst>
+          </p:cNvPr>
+          <p:cNvSpPr>
+            <a:spLocks noGrp="1"/>
+          </p:cNvSpPr>
+          <p:nvPr>
+            <p:ph type="title"/>
+          </p:nvPr>
+        </p:nvSpPr>
+        <p:spPr/>
+        <p:txBody>
+          <a:bodyPr/>
+          <a:lstStyle/>
+          <a:p>
+            <a:r>
+              <a:rPr lang="en-US" dirty="0"/>
+              <a:t>Heap Complexity </a:t>
+            </a:r>
+          </a:p>
+        </p:txBody>
+      </p:sp>
+      <p:sp>
+        <p:nvSpPr>
+          <p:cNvPr id="3" name="Content Placeholder 2">
+            <a:extLst>
+              <a:ext uri="{FF2B5EF4-FFF2-40B4-BE49-F238E27FC236}">
+                <a16:creationId xmlns:a16="http://schemas.microsoft.com/office/drawing/2014/main" id="{51A3B490-F5BA-BADC-D57D-6FE13FA89BFF}"/>
+              </a:ext>
+            </a:extLst>
+          </p:cNvPr>
+          <p:cNvSpPr>
+            <a:spLocks noGrp="1"/>
+          </p:cNvSpPr>
+          <p:nvPr>
+            <p:ph idx="1"/>
+          </p:nvPr>
+        </p:nvSpPr>
+        <p:spPr/>
+        <p:txBody>
+          <a:bodyPr/>
+          <a:lstStyle/>
+          <a:p>
+            <a:endParaRPr lang="en-US"/>
+          </a:p>
+        </p:txBody>
+      </p:sp>
+    </p:spTree>
+    <p:extLst>
+      <p:ext uri="{BB962C8B-B14F-4D97-AF65-F5344CB8AC3E}">
+        <p14:creationId xmlns:p14="http://schemas.microsoft.com/office/powerpoint/2010/main" val="2236015580"/>
+      </p:ext>
+    </p:extLst>
+  </p:cSld>
+  <p:clrMapOvr>
+    <a:masterClrMapping/>
+  </p:clrMapOvr>
+</p:sld>
+</file>
+
+<file path=ppt/slides/slide43.xml><?xml version="1.0" encoding="utf-8"?>
+<p:sld xmlns:a="http://schemas.openxmlformats.org/drawingml/2006/main" xmlns:r="http://schemas.openxmlformats.org/officeDocument/2006/relationships" xmlns:p="http://schemas.openxmlformats.org/presentationml/2006/main">
+  <p:cSld>
+    <p:spTree>
+      <p:nvGrpSpPr>
+        <p:cNvPr id="1" name=""/>
+        <p:cNvGrpSpPr/>
+        <p:nvPr/>
+      </p:nvGrpSpPr>
+      <p:grpSpPr>
+        <a:xfrm>
+          <a:off x="0" y="0"/>
+          <a:ext cx="0" cy="0"/>
+          <a:chOff x="0" y="0"/>
+          <a:chExt cx="0" cy="0"/>
+        </a:xfrm>
+      </p:grpSpPr>
+      <p:sp>
+        <p:nvSpPr>
+          <p:cNvPr id="2" name="Title 1">
+            <a:extLst>
+              <a:ext uri="{FF2B5EF4-FFF2-40B4-BE49-F238E27FC236}">
+                <a16:creationId xmlns:a16="http://schemas.microsoft.com/office/drawing/2014/main" id="{267C51AF-8B58-DE7D-CC4E-BC7FDEC8C54E}"/>
+              </a:ext>
+            </a:extLst>
+          </p:cNvPr>
+          <p:cNvSpPr>
+            <a:spLocks noGrp="1"/>
+          </p:cNvSpPr>
+          <p:nvPr>
+            <p:ph type="title"/>
+          </p:nvPr>
+        </p:nvSpPr>
+        <p:spPr/>
+        <p:txBody>
+          <a:bodyPr>
+            <a:normAutofit fontScale="90000"/>
+          </a:bodyPr>
+          <a:lstStyle/>
+          <a:p>
+            <a:r>
+              <a:rPr lang="en-US" dirty="0"/>
+              <a:t>Draw the max-heap for the following numbers, then remove 3 elements.</a:t>
+            </a:r>
+            <a:br>
+              <a:rPr lang="en-US" dirty="0"/>
+            </a:br>
+            <a:r>
+              <a:rPr lang="en-US" dirty="0"/>
+              <a:t>3, 14, 4, 8, 15, 16, 9, 12, 20</a:t>
+            </a:r>
+          </a:p>
+        </p:txBody>
+      </p:sp>
+    </p:spTree>
+    <p:extLst>
+      <p:ext uri="{BB962C8B-B14F-4D97-AF65-F5344CB8AC3E}">
+        <p14:creationId xmlns:p14="http://schemas.microsoft.com/office/powerpoint/2010/main" val="1682147628"/>
+      </p:ext>
+    </p:extLst>
+  </p:cSld>
+  <p:clrMapOvr>
+    <a:masterClrMapping/>
+  </p:clrMapOvr>
+</p:sld>
+</file>
+
+<file path=ppt/slides/slide44.xml><?xml version="1.0" encoding="utf-8"?>
+<p:sld xmlns:a="http://schemas.openxmlformats.org/drawingml/2006/main" xmlns:r="http://schemas.openxmlformats.org/officeDocument/2006/relationships" xmlns:p="http://schemas.openxmlformats.org/presentationml/2006/main">
+  <p:cSld>
+    <p:spTree>
+      <p:nvGrpSpPr>
+        <p:cNvPr id="1" name=""/>
+        <p:cNvGrpSpPr/>
+        <p:nvPr/>
+      </p:nvGrpSpPr>
+      <p:grpSpPr>
+        <a:xfrm>
+          <a:off x="0" y="0"/>
+          <a:ext cx="0" cy="0"/>
+          <a:chOff x="0" y="0"/>
+          <a:chExt cx="0" cy="0"/>
+        </a:xfrm>
+      </p:grpSpPr>
+      <p:sp>
+        <p:nvSpPr>
+          <p:cNvPr id="2" name="Title 1">
+            <a:extLst>
+              <a:ext uri="{FF2B5EF4-FFF2-40B4-BE49-F238E27FC236}">
+                <a16:creationId xmlns:a16="http://schemas.microsoft.com/office/drawing/2014/main" id="{D6C1DDD9-6EA0-5F0A-5E34-B23946796A55}"/>
+              </a:ext>
+            </a:extLst>
+          </p:cNvPr>
+          <p:cNvSpPr>
+            <a:spLocks noGrp="1"/>
+          </p:cNvSpPr>
+          <p:nvPr>
+            <p:ph type="title"/>
+          </p:nvPr>
+        </p:nvSpPr>
+        <p:spPr/>
+        <p:txBody>
+          <a:bodyPr/>
+          <a:lstStyle/>
+          <a:p>
+            <a:r>
+              <a:rPr lang="en-US" dirty="0"/>
+              <a:t>Cool-Down: Solve my to-do list</a:t>
+            </a:r>
+          </a:p>
+        </p:txBody>
+      </p:sp>
+      <p:sp>
+        <p:nvSpPr>
+          <p:cNvPr id="3" name="Content Placeholder 2">
+            <a:extLst>
+              <a:ext uri="{FF2B5EF4-FFF2-40B4-BE49-F238E27FC236}">
+                <a16:creationId xmlns:a16="http://schemas.microsoft.com/office/drawing/2014/main" id="{3883A3B8-678A-E1FA-ECF4-D1C0A8BE1692}"/>
+              </a:ext>
+            </a:extLst>
+          </p:cNvPr>
+          <p:cNvSpPr>
+            <a:spLocks noGrp="1"/>
+          </p:cNvSpPr>
+          <p:nvPr>
+            <p:ph idx="1"/>
+          </p:nvPr>
+        </p:nvSpPr>
+        <p:spPr>
+          <a:xfrm>
+            <a:off x="838200" y="1458097"/>
+            <a:ext cx="11086070" cy="5034778"/>
+          </a:xfrm>
+        </p:spPr>
+        <p:txBody>
+          <a:bodyPr>
+            <a:normAutofit fontScale="92500"/>
+          </a:bodyPr>
+          <a:lstStyle/>
+          <a:p>
+            <a:endParaRPr lang="en-US" dirty="0"/>
+          </a:p>
+          <a:p>
+            <a:endParaRPr lang="en-US" dirty="0"/>
+          </a:p>
+          <a:p>
+            <a:endParaRPr lang="en-US" dirty="0"/>
+          </a:p>
+          <a:p>
+            <a:endParaRPr lang="en-US" dirty="0"/>
+          </a:p>
+          <a:p>
+            <a:endParaRPr lang="en-US" dirty="0"/>
+          </a:p>
+          <a:p>
+            <a:pPr marL="0" indent="0">
+              <a:buNone/>
+            </a:pPr>
+            <a:endParaRPr lang="en-US" dirty="0"/>
+          </a:p>
+          <a:p>
+            <a:pPr marL="0" indent="0">
+              <a:buNone/>
+            </a:pPr>
+            <a:endParaRPr lang="en-US" dirty="0"/>
+          </a:p>
+          <a:p>
+            <a:r>
+              <a:rPr lang="en-US" dirty="0"/>
+              <a:t>Discuss on what variable or combination of variables you will optimize.</a:t>
+            </a:r>
+          </a:p>
+          <a:p>
+            <a:r>
+              <a:rPr lang="en-US" dirty="0"/>
+              <a:t>Describe on the board how you will construct a priority queue, and use a heap to return the order of tasks I should complete, until the queue is empty.</a:t>
+            </a:r>
+          </a:p>
+          <a:p>
+            <a:pPr lvl="1"/>
+            <a:endParaRPr lang="en-US" dirty="0"/>
+          </a:p>
+        </p:txBody>
+      </p:sp>
+      <p:graphicFrame>
+        <p:nvGraphicFramePr>
+          <p:cNvPr id="4" name="Table 3">
+            <a:extLst>
+              <a:ext uri="{FF2B5EF4-FFF2-40B4-BE49-F238E27FC236}">
+                <a16:creationId xmlns:a16="http://schemas.microsoft.com/office/drawing/2014/main" id="{8409008F-8863-FF4F-7172-FA8FC82B4B5A}"/>
+              </a:ext>
+            </a:extLst>
+          </p:cNvPr>
+          <p:cNvGraphicFramePr>
+            <a:graphicFrameLocks noGrp="1"/>
+          </p:cNvGraphicFramePr>
+          <p:nvPr>
+            <p:extLst>
+              <p:ext uri="{D42A27DB-BD31-4B8C-83A1-F6EECF244321}">
+                <p14:modId xmlns:p14="http://schemas.microsoft.com/office/powerpoint/2010/main" val="2490625219"/>
+              </p:ext>
+            </p:extLst>
+          </p:nvPr>
+        </p:nvGraphicFramePr>
+        <p:xfrm>
+          <a:off x="1080186" y="1445735"/>
+          <a:ext cx="10031628" cy="2966720"/>
+        </p:xfrm>
+        <a:graphic>
+          <a:graphicData uri="http://schemas.openxmlformats.org/drawingml/2006/table">
+            <a:tbl>
+              <a:tblPr firstRow="1" bandRow="1">
+                <a:tableStyleId>{5C22544A-7EE6-4342-B048-85BDC9FD1C3A}</a:tableStyleId>
+              </a:tblPr>
+              <a:tblGrid>
+                <a:gridCol w="3986084">
+                  <a:extLst>
+                    <a:ext uri="{9D8B030D-6E8A-4147-A177-3AD203B41FA5}">
+                      <a16:colId xmlns:a16="http://schemas.microsoft.com/office/drawing/2014/main" val="996818835"/>
+                    </a:ext>
+                  </a:extLst>
+                </a:gridCol>
+                <a:gridCol w="2701668">
+                  <a:extLst>
+                    <a:ext uri="{9D8B030D-6E8A-4147-A177-3AD203B41FA5}">
+                      <a16:colId xmlns:a16="http://schemas.microsoft.com/office/drawing/2014/main" val="2964340360"/>
+                    </a:ext>
+                  </a:extLst>
+                </a:gridCol>
+                <a:gridCol w="3343876">
+                  <a:extLst>
+                    <a:ext uri="{9D8B030D-6E8A-4147-A177-3AD203B41FA5}">
+                      <a16:colId xmlns:a16="http://schemas.microsoft.com/office/drawing/2014/main" val="3186455147"/>
+                    </a:ext>
+                  </a:extLst>
+                </a:gridCol>
+              </a:tblGrid>
+              <a:tr h="370840">
+                <a:tc>
+                  <a:txBody>
+                    <a:bodyPr/>
+                    <a:lstStyle/>
+                    <a:p>
+                      <a:r>
+                        <a:rPr lang="en-US" dirty="0"/>
+                        <a:t>Task</a:t>
+                      </a:r>
+                    </a:p>
+                  </a:txBody>
+                  <a:tcPr/>
+                </a:tc>
+                <a:tc>
+                  <a:txBody>
+                    <a:bodyPr/>
+                    <a:lstStyle/>
+                    <a:p>
+                      <a:r>
+                        <a:rPr lang="en-US" dirty="0"/>
+                        <a:t>Deadline</a:t>
+                      </a:r>
+                    </a:p>
+                  </a:txBody>
+                  <a:tcPr/>
+                </a:tc>
+                <a:tc>
+                  <a:txBody>
+                    <a:bodyPr/>
+                    <a:lstStyle/>
+                    <a:p>
+                      <a:r>
+                        <a:rPr lang="en-US" dirty="0"/>
+                        <a:t>Dr. Roscoe's Priority</a:t>
+                      </a:r>
+                    </a:p>
+                  </a:txBody>
+                  <a:tcPr/>
+                </a:tc>
+                <a:extLst>
+                  <a:ext uri="{0D108BD9-81ED-4DB2-BD59-A6C34878D82A}">
+                    <a16:rowId xmlns:a16="http://schemas.microsoft.com/office/drawing/2014/main" val="1804735396"/>
+                  </a:ext>
+                </a:extLst>
+              </a:tr>
+              <a:tr h="370840">
+                <a:tc>
+                  <a:txBody>
+                    <a:bodyPr/>
+                    <a:lstStyle/>
+                    <a:p>
+                      <a:r>
+                        <a:rPr lang="en-US" dirty="0"/>
+                        <a:t>Grade Algorithms HW 1</a:t>
+                      </a:r>
+                    </a:p>
+                  </a:txBody>
+                  <a:tcPr/>
+                </a:tc>
+                <a:tc>
+                  <a:txBody>
+                    <a:bodyPr/>
+                    <a:lstStyle/>
+                    <a:p>
+                      <a:r>
+                        <a:rPr lang="en-US" dirty="0"/>
+                        <a:t>Tuesday</a:t>
+                      </a:r>
+                    </a:p>
+                  </a:txBody>
+                  <a:tcPr/>
+                </a:tc>
+                <a:tc>
+                  <a:txBody>
+                    <a:bodyPr/>
+                    <a:lstStyle/>
+                    <a:p>
+                      <a:r>
+                        <a:rPr lang="en-US" dirty="0"/>
+                        <a:t>1</a:t>
+                      </a:r>
+                    </a:p>
+                  </a:txBody>
+                  <a:tcPr/>
+                </a:tc>
+                <a:extLst>
+                  <a:ext uri="{0D108BD9-81ED-4DB2-BD59-A6C34878D82A}">
+                    <a16:rowId xmlns:a16="http://schemas.microsoft.com/office/drawing/2014/main" val="1376833858"/>
+                  </a:ext>
+                </a:extLst>
+              </a:tr>
+              <a:tr h="370840">
+                <a:tc>
+                  <a:txBody>
+                    <a:bodyPr/>
+                    <a:lstStyle/>
+                    <a:p>
+                      <a:r>
+                        <a:rPr lang="en-US" dirty="0"/>
+                        <a:t>Knit hat</a:t>
+                      </a:r>
+                    </a:p>
+                  </a:txBody>
+                  <a:tcPr/>
+                </a:tc>
+                <a:tc>
+                  <a:txBody>
+                    <a:bodyPr/>
+                    <a:lstStyle/>
+                    <a:p>
+                      <a:r>
+                        <a:rPr lang="en-US" dirty="0"/>
+                        <a:t>March 31</a:t>
+                      </a:r>
+                    </a:p>
+                  </a:txBody>
+                  <a:tcPr/>
+                </a:tc>
+                <a:tc>
+                  <a:txBody>
+                    <a:bodyPr/>
+                    <a:lstStyle/>
+                    <a:p>
+                      <a:r>
+                        <a:rPr lang="en-US" dirty="0"/>
+                        <a:t>5</a:t>
+                      </a:r>
+                    </a:p>
+                  </a:txBody>
+                  <a:tcPr/>
+                </a:tc>
+                <a:extLst>
+                  <a:ext uri="{0D108BD9-81ED-4DB2-BD59-A6C34878D82A}">
+                    <a16:rowId xmlns:a16="http://schemas.microsoft.com/office/drawing/2014/main" val="2491009999"/>
+                  </a:ext>
+                </a:extLst>
+              </a:tr>
+              <a:tr h="370840">
+                <a:tc>
+                  <a:txBody>
+                    <a:bodyPr/>
+                    <a:lstStyle/>
+                    <a:p>
+                      <a:r>
+                        <a:rPr lang="en-US" dirty="0"/>
+                        <a:t>Read a research paper</a:t>
+                      </a:r>
+                    </a:p>
+                  </a:txBody>
+                  <a:tcPr/>
+                </a:tc>
+                <a:tc>
+                  <a:txBody>
+                    <a:bodyPr/>
+                    <a:lstStyle/>
+                    <a:p>
+                      <a:r>
+                        <a:rPr lang="en-US" dirty="0"/>
+                        <a:t>Friday</a:t>
+                      </a:r>
+                    </a:p>
+                  </a:txBody>
+                  <a:tcPr/>
+                </a:tc>
+                <a:tc>
+                  <a:txBody>
+                    <a:bodyPr/>
+                    <a:lstStyle/>
+                    <a:p>
+                      <a:r>
+                        <a:rPr lang="en-US" dirty="0"/>
+                        <a:t>2</a:t>
+                      </a:r>
+                    </a:p>
+                  </a:txBody>
+                  <a:tcPr/>
+                </a:tc>
+                <a:extLst>
+                  <a:ext uri="{0D108BD9-81ED-4DB2-BD59-A6C34878D82A}">
+                    <a16:rowId xmlns:a16="http://schemas.microsoft.com/office/drawing/2014/main" val="800424378"/>
+                  </a:ext>
+                </a:extLst>
+              </a:tr>
+              <a:tr h="370840">
+                <a:tc>
+                  <a:txBody>
+                    <a:bodyPr/>
+                    <a:lstStyle/>
+                    <a:p>
+                      <a:r>
+                        <a:rPr lang="en-US" dirty="0"/>
+                        <a:t>Post the Stats homework</a:t>
+                      </a:r>
+                    </a:p>
+                  </a:txBody>
+                  <a:tcPr/>
+                </a:tc>
+                <a:tc>
+                  <a:txBody>
+                    <a:bodyPr/>
+                    <a:lstStyle/>
+                    <a:p>
+                      <a:r>
+                        <a:rPr lang="en-US" dirty="0"/>
+                        <a:t>5pm today</a:t>
+                      </a:r>
+                    </a:p>
+                  </a:txBody>
+                  <a:tcPr/>
+                </a:tc>
+                <a:tc>
+                  <a:txBody>
+                    <a:bodyPr/>
+                    <a:lstStyle/>
+                    <a:p>
+                      <a:r>
+                        <a:rPr lang="en-US" dirty="0"/>
+                        <a:t>2</a:t>
+                      </a:r>
+                    </a:p>
+                  </a:txBody>
+                  <a:tcPr/>
+                </a:tc>
+                <a:extLst>
+                  <a:ext uri="{0D108BD9-81ED-4DB2-BD59-A6C34878D82A}">
+                    <a16:rowId xmlns:a16="http://schemas.microsoft.com/office/drawing/2014/main" val="21183193"/>
+                  </a:ext>
+                </a:extLst>
+              </a:tr>
+              <a:tr h="370840">
+                <a:tc>
+                  <a:txBody>
+                    <a:bodyPr/>
+                    <a:lstStyle/>
+                    <a:p>
+                      <a:r>
+                        <a:rPr lang="en-US" dirty="0"/>
+                        <a:t>Submit Jan Term proposal</a:t>
+                      </a:r>
+                    </a:p>
+                  </a:txBody>
+                  <a:tcPr/>
+                </a:tc>
+                <a:tc>
+                  <a:txBody>
+                    <a:bodyPr/>
+                    <a:lstStyle/>
+                    <a:p>
+                      <a:r>
+                        <a:rPr lang="en-US" dirty="0"/>
+                        <a:t>Sunday 11:59pm</a:t>
+                      </a:r>
+                    </a:p>
+                  </a:txBody>
+                  <a:tcPr/>
+                </a:tc>
+                <a:tc>
+                  <a:txBody>
+                    <a:bodyPr/>
+                    <a:lstStyle/>
+                    <a:p>
+                      <a:r>
+                        <a:rPr lang="en-US" dirty="0"/>
+                        <a:t>1</a:t>
+                      </a:r>
+                    </a:p>
+                  </a:txBody>
+                  <a:tcPr/>
+                </a:tc>
+                <a:extLst>
+                  <a:ext uri="{0D108BD9-81ED-4DB2-BD59-A6C34878D82A}">
+                    <a16:rowId xmlns:a16="http://schemas.microsoft.com/office/drawing/2014/main" val="2267053249"/>
+                  </a:ext>
+                </a:extLst>
+              </a:tr>
+              <a:tr h="370840">
+                <a:tc>
+                  <a:txBody>
+                    <a:bodyPr/>
+                    <a:lstStyle/>
+                    <a:p>
+                      <a:r>
+                        <a:rPr lang="en-US" dirty="0"/>
+                        <a:t>Post Algorithms video</a:t>
+                      </a:r>
+                    </a:p>
+                  </a:txBody>
+                  <a:tcPr/>
+                </a:tc>
+                <a:tc>
+                  <a:txBody>
+                    <a:bodyPr/>
+                    <a:lstStyle/>
+                    <a:p>
+                      <a:r>
+                        <a:rPr lang="en-US" dirty="0"/>
+                        <a:t>5pm today</a:t>
+                      </a:r>
+                    </a:p>
+                  </a:txBody>
+                  <a:tcPr/>
+                </a:tc>
+                <a:tc>
+                  <a:txBody>
+                    <a:bodyPr/>
+                    <a:lstStyle/>
+                    <a:p>
+                      <a:r>
+                        <a:rPr lang="en-US" dirty="0"/>
+                        <a:t>1</a:t>
+                      </a:r>
+                    </a:p>
+                  </a:txBody>
+                  <a:tcPr/>
+                </a:tc>
+                <a:extLst>
+                  <a:ext uri="{0D108BD9-81ED-4DB2-BD59-A6C34878D82A}">
+                    <a16:rowId xmlns:a16="http://schemas.microsoft.com/office/drawing/2014/main" val="947794353"/>
+                  </a:ext>
+                </a:extLst>
+              </a:tr>
+              <a:tr h="370840">
+                <a:tc>
+                  <a:txBody>
+                    <a:bodyPr/>
+                    <a:lstStyle/>
+                    <a:p>
+                      <a:r>
+                        <a:rPr lang="en-US" dirty="0"/>
+                        <a:t>Write a section of research paper</a:t>
+                      </a:r>
+                    </a:p>
+                  </a:txBody>
+                  <a:tcPr/>
+                </a:tc>
+                <a:tc>
+                  <a:txBody>
+                    <a:bodyPr/>
+                    <a:lstStyle/>
+                    <a:p>
+                      <a:r>
+                        <a:rPr lang="en-US" dirty="0"/>
+                        <a:t>5pm today</a:t>
+                      </a:r>
+                    </a:p>
+                  </a:txBody>
+                  <a:tcPr/>
+                </a:tc>
+                <a:tc>
+                  <a:txBody>
+                    <a:bodyPr/>
+                    <a:lstStyle/>
+                    <a:p>
+                      <a:r>
+                        <a:rPr lang="en-US" dirty="0"/>
+                        <a:t>1</a:t>
+                      </a:r>
+                    </a:p>
+                  </a:txBody>
+                  <a:tcPr/>
+                </a:tc>
+                <a:extLst>
+                  <a:ext uri="{0D108BD9-81ED-4DB2-BD59-A6C34878D82A}">
+                    <a16:rowId xmlns:a16="http://schemas.microsoft.com/office/drawing/2014/main" val="387079988"/>
+                  </a:ext>
+                </a:extLst>
+              </a:tr>
+            </a:tbl>
+          </a:graphicData>
+        </a:graphic>
+      </p:graphicFrame>
+    </p:spTree>
+    <p:extLst>
+      <p:ext uri="{BB962C8B-B14F-4D97-AF65-F5344CB8AC3E}">
+        <p14:creationId xmlns:p14="http://schemas.microsoft.com/office/powerpoint/2010/main" val="3978291062"/>
+      </p:ext>
+    </p:extLst>
+  </p:cSld>
+  <p:clrMapOvr>
+    <a:masterClrMapping/>
+  </p:clrMapOvr>
+</p:sld>
+</file>
+
+<file path=ppt/slides/slide45.xml><?xml version="1.0" encoding="utf-8"?>
+<p:sld xmlns:a="http://schemas.openxmlformats.org/drawingml/2006/main" xmlns:r="http://schemas.openxmlformats.org/officeDocument/2006/relationships" xmlns:p="http://schemas.openxmlformats.org/presentationml/2006/main">
+  <p:cSld>
+    <p:spTree>
+      <p:nvGrpSpPr>
+        <p:cNvPr id="1" name=""/>
+        <p:cNvGrpSpPr/>
+        <p:nvPr/>
+      </p:nvGrpSpPr>
+      <p:grpSpPr>
+        <a:xfrm>
+          <a:off x="0" y="0"/>
+          <a:ext cx="0" cy="0"/>
+          <a:chOff x="0" y="0"/>
+          <a:chExt cx="0" cy="0"/>
+        </a:xfrm>
+      </p:grpSpPr>
+      <p:sp>
+        <p:nvSpPr>
+          <p:cNvPr id="4" name="Title 3">
+            <a:extLst>
+              <a:ext uri="{FF2B5EF4-FFF2-40B4-BE49-F238E27FC236}">
+                <a16:creationId xmlns:a16="http://schemas.microsoft.com/office/drawing/2014/main" id="{1AB13D4F-4B54-2CFD-45CE-D820434DD421}"/>
+              </a:ext>
+            </a:extLst>
+          </p:cNvPr>
+          <p:cNvSpPr>
+            <a:spLocks noGrp="1"/>
+          </p:cNvSpPr>
+          <p:nvPr>
+            <p:ph type="title"/>
+          </p:nvPr>
+        </p:nvSpPr>
+        <p:spPr/>
+        <p:txBody>
+          <a:bodyPr/>
+          <a:lstStyle/>
+          <a:p>
+            <a:r>
+              <a:rPr lang="en-US" dirty="0"/>
+              <a:t>These slides are work-in-progress; more will be added</a:t>
+            </a:r>
+          </a:p>
+        </p:txBody>
+      </p:sp>
+      <p:sp>
+        <p:nvSpPr>
+          <p:cNvPr id="5" name="Text Placeholder 4">
+            <a:extLst>
+              <a:ext uri="{FF2B5EF4-FFF2-40B4-BE49-F238E27FC236}">
+                <a16:creationId xmlns:a16="http://schemas.microsoft.com/office/drawing/2014/main" id="{4E8CBB95-B5A0-4E31-8197-E2631EE1CA41}"/>
+              </a:ext>
+            </a:extLst>
+          </p:cNvPr>
+          <p:cNvSpPr>
+            <a:spLocks noGrp="1"/>
+          </p:cNvSpPr>
+          <p:nvPr>
+            <p:ph type="body" idx="1"/>
+          </p:nvPr>
+        </p:nvSpPr>
+        <p:spPr/>
+        <p:txBody>
+          <a:bodyPr/>
+          <a:lstStyle/>
+          <a:p>
+            <a:endParaRPr lang="en-US"/>
+          </a:p>
+        </p:txBody>
+      </p:sp>
+    </p:spTree>
+    <p:extLst>
+      <p:ext uri="{BB962C8B-B14F-4D97-AF65-F5344CB8AC3E}">
+        <p14:creationId xmlns:p14="http://schemas.microsoft.com/office/powerpoint/2010/main" val="661472011"/>
       </p:ext>
     </p:extLst>
   </p:cSld>
@@ -7586,8 +9867,8 @@
           </a:p>
         </p:txBody>
       </p:sp>
-      <mc:AlternateContent xmlns:mc="http://schemas.openxmlformats.org/markup-compatibility/2006">
-        <mc:Choice xmlns:a14="http://schemas.microsoft.com/office/drawing/2010/main" Requires="a14">
+      <mc:AlternateContent xmlns:mc="http://schemas.openxmlformats.org/markup-compatibility/2006" xmlns:a14="http://schemas.microsoft.com/office/drawing/2010/main">
+        <mc:Choice Requires="a14">
           <p:sp>
             <p:nvSpPr>
               <p:cNvPr id="3" name="Content Placeholder 2">
@@ -7678,7 +9959,7 @@
             </p:txBody>
           </p:sp>
         </mc:Choice>
-        <mc:Fallback>
+        <mc:Fallback xmlns="">
           <p:sp>
             <p:nvSpPr>
               <p:cNvPr id="3" name="Content Placeholder 2">
@@ -8097,8 +10378,8 @@
           </a:p>
         </p:txBody>
       </p:sp>
-      <mc:AlternateContent xmlns:mc="http://schemas.openxmlformats.org/markup-compatibility/2006">
-        <mc:Choice xmlns:a14="http://schemas.microsoft.com/office/drawing/2010/main" Requires="a14">
+      <mc:AlternateContent xmlns:mc="http://schemas.openxmlformats.org/markup-compatibility/2006" xmlns:a14="http://schemas.microsoft.com/office/drawing/2010/main">
+        <mc:Choice Requires="a14">
           <p:sp>
             <p:nvSpPr>
               <p:cNvPr id="3" name="Content Placeholder 2">
@@ -8189,7 +10470,7 @@
             </p:txBody>
           </p:sp>
         </mc:Choice>
-        <mc:Fallback>
+        <mc:Fallback xmlns="">
           <p:sp>
             <p:nvSpPr>
               <p:cNvPr id="3" name="Content Placeholder 2">

</xml_diff>